<commit_message>
Updating slides for CAV
</commit_message>
<xml_diff>
--- a/talks/CAV2016/CAV_HCVVW16_SCXML.pptx
+++ b/talks/CAV2016/CAV_HCVVW16_SCXML.pptx
@@ -5,29 +5,30 @@
     <p:sldMasterId id="2147483661" r:id="rId1"/>
   </p:sldMasterIdLst>
   <p:notesMasterIdLst>
-    <p:notesMasterId r:id="rId22"/>
+    <p:notesMasterId r:id="rId23"/>
   </p:notesMasterIdLst>
   <p:sldIdLst>
     <p:sldId id="328" r:id="rId2"/>
-    <p:sldId id="330" r:id="rId3"/>
-    <p:sldId id="331" r:id="rId4"/>
-    <p:sldId id="332" r:id="rId5"/>
-    <p:sldId id="333" r:id="rId6"/>
-    <p:sldId id="334" r:id="rId7"/>
-    <p:sldId id="335" r:id="rId8"/>
-    <p:sldId id="336" r:id="rId9"/>
-    <p:sldId id="337" r:id="rId10"/>
-    <p:sldId id="338" r:id="rId11"/>
-    <p:sldId id="339" r:id="rId12"/>
-    <p:sldId id="340" r:id="rId13"/>
-    <p:sldId id="341" r:id="rId14"/>
-    <p:sldId id="342" r:id="rId15"/>
-    <p:sldId id="343" r:id="rId16"/>
-    <p:sldId id="344" r:id="rId17"/>
-    <p:sldId id="345" r:id="rId18"/>
-    <p:sldId id="346" r:id="rId19"/>
-    <p:sldId id="347" r:id="rId20"/>
-    <p:sldId id="326" r:id="rId21"/>
+    <p:sldId id="348" r:id="rId3"/>
+    <p:sldId id="330" r:id="rId4"/>
+    <p:sldId id="331" r:id="rId5"/>
+    <p:sldId id="332" r:id="rId6"/>
+    <p:sldId id="333" r:id="rId7"/>
+    <p:sldId id="334" r:id="rId8"/>
+    <p:sldId id="335" r:id="rId9"/>
+    <p:sldId id="336" r:id="rId10"/>
+    <p:sldId id="337" r:id="rId11"/>
+    <p:sldId id="338" r:id="rId12"/>
+    <p:sldId id="339" r:id="rId13"/>
+    <p:sldId id="340" r:id="rId14"/>
+    <p:sldId id="341" r:id="rId15"/>
+    <p:sldId id="342" r:id="rId16"/>
+    <p:sldId id="343" r:id="rId17"/>
+    <p:sldId id="344" r:id="rId18"/>
+    <p:sldId id="345" r:id="rId19"/>
+    <p:sldId id="346" r:id="rId20"/>
+    <p:sldId id="347" r:id="rId21"/>
+    <p:sldId id="326" r:id="rId22"/>
   </p:sldIdLst>
   <p:sldSz cx="9144000" cy="6858000" type="screen4x3"/>
   <p:notesSz cx="6858000" cy="9144000"/>
@@ -228,7 +229,7 @@
             <a:fld id="{550DA187-7D7D-8C4A-A73A-368BA766A389}" type="datetimeFigureOut">
               <a:rPr lang="en-GB" smtClean="0"/>
               <a:pPr/>
-              <a:t>04/07/2016</a:t>
+              <a:t>06/07/2016</a:t>
             </a:fld>
             <a:endParaRPr lang="en-GB"/>
           </a:p>
@@ -565,7 +566,7 @@
             <a:fld id="{814C9A0D-E8E4-5741-9CB1-BBD0C1D4FD37}" type="slidenum">
               <a:rPr lang="en-GB" smtClean="0"/>
               <a:pPr/>
-              <a:t>2</a:t>
+              <a:t>3</a:t>
             </a:fld>
             <a:endParaRPr lang="en-GB"/>
           </a:p>
@@ -986,7 +987,7 @@
             <a:fld id="{03E632DE-081F-CD46-A6DB-B798177DF416}" type="datetimeFigureOut">
               <a:rPr lang="en-GB" smtClean="0"/>
               <a:pPr/>
-              <a:t>04/07/2016</a:t>
+              <a:t>06/07/2016</a:t>
             </a:fld>
             <a:endParaRPr lang="en-GB"/>
           </a:p>
@@ -1178,7 +1179,7 @@
             <a:fld id="{03E632DE-081F-CD46-A6DB-B798177DF416}" type="datetimeFigureOut">
               <a:rPr lang="en-GB" smtClean="0"/>
               <a:pPr/>
-              <a:t>04/07/2016</a:t>
+              <a:t>06/07/2016</a:t>
             </a:fld>
             <a:endParaRPr lang="en-GB"/>
           </a:p>
@@ -1413,7 +1414,7 @@
             <a:fld id="{03E632DE-081F-CD46-A6DB-B798177DF416}" type="datetimeFigureOut">
               <a:rPr lang="en-GB" smtClean="0"/>
               <a:pPr/>
-              <a:t>04/07/2016</a:t>
+              <a:t>06/07/2016</a:t>
             </a:fld>
             <a:endParaRPr lang="en-GB"/>
           </a:p>
@@ -1582,7 +1583,7 @@
             <a:fld id="{03E632DE-081F-CD46-A6DB-B798177DF416}" type="datetimeFigureOut">
               <a:rPr lang="en-GB" smtClean="0"/>
               <a:pPr/>
-              <a:t>04/07/2016</a:t>
+              <a:t>06/07/2016</a:t>
             </a:fld>
             <a:endParaRPr lang="en-GB"/>
           </a:p>
@@ -1777,7 +1778,7 @@
             <a:fld id="{03E632DE-081F-CD46-A6DB-B798177DF416}" type="datetimeFigureOut">
               <a:rPr lang="en-GB" smtClean="0"/>
               <a:pPr/>
-              <a:t>04/07/2016</a:t>
+              <a:t>06/07/2016</a:t>
             </a:fld>
             <a:endParaRPr lang="en-GB"/>
           </a:p>
@@ -1988,7 +1989,7 @@
             <a:fld id="{03E632DE-081F-CD46-A6DB-B798177DF416}" type="datetimeFigureOut">
               <a:rPr lang="en-GB" smtClean="0"/>
               <a:pPr/>
-              <a:t>04/07/2016</a:t>
+              <a:t>06/07/2016</a:t>
             </a:fld>
             <a:endParaRPr lang="en-GB"/>
           </a:p>
@@ -2298,7 +2299,7 @@
             <a:fld id="{03E632DE-081F-CD46-A6DB-B798177DF416}" type="datetimeFigureOut">
               <a:rPr lang="en-GB" smtClean="0"/>
               <a:pPr/>
-              <a:t>04/07/2016</a:t>
+              <a:t>06/07/2016</a:t>
             </a:fld>
             <a:endParaRPr lang="en-GB"/>
           </a:p>
@@ -2746,7 +2747,7 @@
             <a:fld id="{03E632DE-081F-CD46-A6DB-B798177DF416}" type="datetimeFigureOut">
               <a:rPr lang="en-GB" smtClean="0"/>
               <a:pPr/>
-              <a:t>04/07/2016</a:t>
+              <a:t>06/07/2016</a:t>
             </a:fld>
             <a:endParaRPr lang="en-GB"/>
           </a:p>
@@ -2880,7 +2881,7 @@
             <a:fld id="{03E632DE-081F-CD46-A6DB-B798177DF416}" type="datetimeFigureOut">
               <a:rPr lang="en-GB" smtClean="0"/>
               <a:pPr/>
-              <a:t>04/07/2016</a:t>
+              <a:t>06/07/2016</a:t>
             </a:fld>
             <a:endParaRPr lang="en-GB"/>
           </a:p>
@@ -2984,7 +2985,7 @@
             <a:fld id="{03E632DE-081F-CD46-A6DB-B798177DF416}" type="datetimeFigureOut">
               <a:rPr lang="en-GB" smtClean="0"/>
               <a:pPr/>
-              <a:t>04/07/2016</a:t>
+              <a:t>06/07/2016</a:t>
             </a:fld>
             <a:endParaRPr lang="en-GB"/>
           </a:p>
@@ -3276,7 +3277,7 @@
             <a:fld id="{03E632DE-081F-CD46-A6DB-B798177DF416}" type="datetimeFigureOut">
               <a:rPr lang="en-GB" smtClean="0"/>
               <a:pPr/>
-              <a:t>04/07/2016</a:t>
+              <a:t>06/07/2016</a:t>
             </a:fld>
             <a:endParaRPr lang="en-GB"/>
           </a:p>
@@ -3548,7 +3549,7 @@
             <a:fld id="{03E632DE-081F-CD46-A6DB-B798177DF416}" type="datetimeFigureOut">
               <a:rPr lang="en-GB" smtClean="0"/>
               <a:pPr/>
-              <a:t>04/07/2016</a:t>
+              <a:t>06/07/2016</a:t>
             </a:fld>
             <a:endParaRPr lang="en-GB"/>
           </a:p>
@@ -3724,7 +3725,7 @@
             <a:fld id="{03E632DE-081F-CD46-A6DB-B798177DF416}" type="datetimeFigureOut">
               <a:rPr lang="en-GB" smtClean="0"/>
               <a:pPr/>
-              <a:t>04/07/2016</a:t>
+              <a:t>06/07/2016</a:t>
             </a:fld>
             <a:endParaRPr lang="en-GB"/>
           </a:p>
@@ -4407,10 +4408,6 @@
               <a:rPr lang="en-US" dirty="0"/>
               <a:t>Level Semantics </a:t>
             </a:r>
-            <a:r>
-              <a:rPr lang="en-US" dirty="0"/>
-              <a:t/>
-            </a:r>
             <a:br>
               <a:rPr lang="en-US" dirty="0"/>
             </a:br>
@@ -4574,6 +4571,254 @@
           <a:p>
             <a:r>
               <a:rPr lang="en-US"/>
+              <a:t>SCXML Extensions</a:t>
+            </a:r>
+          </a:p>
+        </p:txBody>
+      </p:sp>
+      <p:sp>
+        <p:nvSpPr>
+          <p:cNvPr id="3" name="Content Placeholder 2"/>
+          <p:cNvSpPr>
+            <a:spLocks noGrp="1"/>
+          </p:cNvSpPr>
+          <p:nvPr>
+            <p:ph idx="1"/>
+          </p:nvPr>
+        </p:nvSpPr>
+        <p:spPr/>
+        <p:txBody>
+          <a:bodyPr>
+            <a:normAutofit/>
+          </a:bodyPr>
+          <a:lstStyle/>
+          <a:p>
+            <a:r>
+              <a:rPr lang="en-US" dirty="0"/>
+              <a:t>XML tools allow new meta-model ‘namespaces’ to be introduced.</a:t>
+            </a:r>
+          </a:p>
+          <a:p>
+            <a:pPr lvl="1"/>
+            <a:r>
+              <a:rPr lang="en-US" dirty="0"/>
+              <a:t>Existing SCXML tools will ignore them</a:t>
+            </a:r>
+          </a:p>
+          <a:p>
+            <a:pPr lvl="1"/>
+            <a:endParaRPr lang="en-US" dirty="0"/>
+          </a:p>
+          <a:p>
+            <a:r>
+              <a:rPr lang="en-US" dirty="0"/>
+              <a:t>Needed in order to support:</a:t>
+            </a:r>
+          </a:p>
+          <a:p>
+            <a:pPr lvl="1"/>
+            <a:r>
+              <a:rPr lang="en-US" dirty="0"/>
+              <a:t>Refinement levels </a:t>
+            </a:r>
+            <a:r>
+              <a:rPr lang="en-US" sz="2000" dirty="0"/>
+              <a:t>(new attribute </a:t>
+            </a:r>
+            <a:r>
+              <a:rPr lang="en-US" sz="2000" dirty="0">
+                <a:solidFill>
+                  <a:srgbClr val="FF0000"/>
+                </a:solidFill>
+              </a:rPr>
+              <a:t>&lt;</a:t>
+            </a:r>
+            <a:r>
+              <a:rPr lang="en-US" sz="2000" dirty="0" err="1">
+                <a:solidFill>
+                  <a:srgbClr val="FF0000"/>
+                </a:solidFill>
+              </a:rPr>
+              <a:t>iumlb:refinement</a:t>
+            </a:r>
+            <a:r>
+              <a:rPr lang="en-US" sz="2000" dirty="0">
+                <a:solidFill>
+                  <a:srgbClr val="FF0000"/>
+                </a:solidFill>
+              </a:rPr>
+              <a:t> </a:t>
+            </a:r>
+            <a:r>
+              <a:rPr lang="is-IS" sz="2000" dirty="0">
+                <a:solidFill>
+                  <a:srgbClr val="FF0000"/>
+                </a:solidFill>
+              </a:rPr>
+              <a:t>…&gt;</a:t>
+            </a:r>
+            <a:r>
+              <a:rPr lang="is-IS" sz="2000" dirty="0"/>
+              <a:t>)</a:t>
+            </a:r>
+            <a:endParaRPr lang="en-US" sz="2000" dirty="0"/>
+          </a:p>
+          <a:p>
+            <a:pPr lvl="1"/>
+            <a:r>
+              <a:rPr lang="en-US" dirty="0"/>
+              <a:t>Invariants		</a:t>
+            </a:r>
+            <a:r>
+              <a:rPr lang="en-US" sz="2000" dirty="0"/>
+              <a:t>(new element </a:t>
+            </a:r>
+            <a:r>
+              <a:rPr lang="en-US" sz="2000" dirty="0">
+                <a:solidFill>
+                  <a:srgbClr val="FF0000"/>
+                </a:solidFill>
+              </a:rPr>
+              <a:t>&lt;</a:t>
+            </a:r>
+            <a:r>
+              <a:rPr lang="en-US" sz="2000" dirty="0" err="1">
+                <a:solidFill>
+                  <a:srgbClr val="FF0000"/>
+                </a:solidFill>
+              </a:rPr>
+              <a:t>iumlb:invariant</a:t>
+            </a:r>
+            <a:r>
+              <a:rPr lang="en-US" sz="2000" dirty="0">
+                <a:solidFill>
+                  <a:srgbClr val="FF0000"/>
+                </a:solidFill>
+              </a:rPr>
+              <a:t> </a:t>
+            </a:r>
+            <a:r>
+              <a:rPr lang="is-IS" sz="2000" dirty="0">
+                <a:solidFill>
+                  <a:srgbClr val="FF0000"/>
+                </a:solidFill>
+              </a:rPr>
+              <a:t>…&gt;</a:t>
+            </a:r>
+            <a:r>
+              <a:rPr lang="is-IS" sz="2000" dirty="0"/>
+              <a:t>)</a:t>
+            </a:r>
+            <a:endParaRPr lang="en-US" sz="2000" dirty="0"/>
+          </a:p>
+          <a:p>
+            <a:pPr lvl="1"/>
+            <a:r>
+              <a:rPr lang="en-US" dirty="0"/>
+              <a:t>Guards			</a:t>
+            </a:r>
+            <a:r>
+              <a:rPr lang="en-US" sz="2000" dirty="0"/>
+              <a:t>(new element </a:t>
+            </a:r>
+            <a:r>
+              <a:rPr lang="en-US" sz="2000" dirty="0">
+                <a:solidFill>
+                  <a:srgbClr val="FF0000"/>
+                </a:solidFill>
+              </a:rPr>
+              <a:t>&lt;</a:t>
+            </a:r>
+            <a:r>
+              <a:rPr lang="en-US" sz="2000" dirty="0" err="1">
+                <a:solidFill>
+                  <a:srgbClr val="FF0000"/>
+                </a:solidFill>
+              </a:rPr>
+              <a:t>iumlb:guard</a:t>
+            </a:r>
+            <a:r>
+              <a:rPr lang="en-US" sz="2000" dirty="0">
+                <a:solidFill>
+                  <a:srgbClr val="FF0000"/>
+                </a:solidFill>
+              </a:rPr>
+              <a:t> </a:t>
+            </a:r>
+            <a:r>
+              <a:rPr lang="is-IS" sz="2000" dirty="0">
+                <a:solidFill>
+                  <a:srgbClr val="FF0000"/>
+                </a:solidFill>
+              </a:rPr>
+              <a:t>…&gt;</a:t>
+            </a:r>
+            <a:r>
+              <a:rPr lang="is-IS" sz="2000" dirty="0"/>
+              <a:t>)</a:t>
+            </a:r>
+            <a:endParaRPr lang="en-US" sz="2000" dirty="0"/>
+          </a:p>
+          <a:p>
+            <a:pPr lvl="1"/>
+            <a:endParaRPr lang="en-US" dirty="0"/>
+          </a:p>
+        </p:txBody>
+      </p:sp>
+    </p:spTree>
+    <p:extLst>
+      <p:ext uri="{BB962C8B-B14F-4D97-AF65-F5344CB8AC3E}">
+        <p14:creationId xmlns:p14="http://schemas.microsoft.com/office/powerpoint/2010/main" val="1426597746"/>
+      </p:ext>
+    </p:extLst>
+  </p:cSld>
+  <p:clrMapOvr>
+    <a:masterClrMapping/>
+  </p:clrMapOvr>
+  <p:timing>
+    <p:tnLst>
+      <p:par>
+        <p:cTn id="1" dur="indefinite" restart="never" nodeType="tmRoot"/>
+      </p:par>
+    </p:tnLst>
+  </p:timing>
+</p:sld>
+</file>
+
+<file path=ppt/slides/slide11.xml><?xml version="1.0" encoding="utf-8"?>
+<p:sld xmlns:a="http://schemas.openxmlformats.org/drawingml/2006/main" xmlns:r="http://schemas.openxmlformats.org/officeDocument/2006/relationships" xmlns:p="http://schemas.openxmlformats.org/presentationml/2006/main">
+  <p:cSld>
+    <p:spTree>
+      <p:nvGrpSpPr>
+        <p:cNvPr id="1" name=""/>
+        <p:cNvGrpSpPr/>
+        <p:nvPr/>
+      </p:nvGrpSpPr>
+      <p:grpSpPr>
+        <a:xfrm>
+          <a:off x="0" y="0"/>
+          <a:ext cx="0" cy="0"/>
+          <a:chOff x="0" y="0"/>
+          <a:chExt cx="0" cy="0"/>
+        </a:xfrm>
+      </p:grpSpPr>
+      <p:sp>
+        <p:nvSpPr>
+          <p:cNvPr id="2" name="Title 1"/>
+          <p:cNvSpPr>
+            <a:spLocks noGrp="1"/>
+          </p:cNvSpPr>
+          <p:nvPr>
+            <p:ph type="title"/>
+          </p:nvPr>
+        </p:nvSpPr>
+        <p:spPr/>
+        <p:txBody>
+          <a:bodyPr/>
+          <a:lstStyle/>
+          <a:p>
+            <a:r>
+              <a:rPr lang="en-US"/>
               <a:t>SCXML Extension Attributes</a:t>
             </a:r>
           </a:p>
@@ -4623,7 +4868,7 @@
 </p:sld>
 </file>
 
-<file path=ppt/slides/slide11.xml><?xml version="1.0" encoding="utf-8"?>
+<file path=ppt/slides/slide12.xml><?xml version="1.0" encoding="utf-8"?>
 <p:sld xmlns:a="http://schemas.openxmlformats.org/drawingml/2006/main" xmlns:r="http://schemas.openxmlformats.org/officeDocument/2006/relationships" xmlns:p="http://schemas.openxmlformats.org/presentationml/2006/main">
   <p:cSld>
     <p:spTree>
@@ -4699,8 +4944,8 @@
         </p:nvSpPr>
         <p:spPr>
           <a:xfrm>
-            <a:off x="579439" y="1883352"/>
-            <a:ext cx="8199436" cy="4524316"/>
+            <a:off x="0" y="1301858"/>
+            <a:ext cx="8972335" cy="5078313"/>
           </a:xfrm>
           <a:prstGeom prst="rect">
             <a:avLst/>
@@ -4713,161 +4958,369 @@
           <a:lstStyle/>
           <a:p>
             <a:r>
-              <a:rPr lang="en-US" sz="1600"/>
-              <a:t>&lt;datamodel </a:t>
-            </a:r>
-            <a:r>
-              <a:rPr lang="en-US" sz="1600">
+              <a:rPr lang="en-US" dirty="0"/>
+              <a:t>&lt;</a:t>
+            </a:r>
+            <a:r>
+              <a:rPr lang="en-US" dirty="0" err="1"/>
+              <a:t>datamodel</a:t>
+            </a:r>
+            <a:r>
+              <a:rPr lang="en-US" dirty="0"/>
+              <a:t> </a:t>
+            </a:r>
+            <a:r>
+              <a:rPr lang="en-US" dirty="0" err="1">
                 <a:solidFill>
                   <a:srgbClr val="FF0000"/>
                 </a:solidFill>
               </a:rPr>
-              <a:t>iumlb:refinement="2"</a:t>
-            </a:r>
-            <a:r>
-              <a:rPr lang="en-US" sz="1600"/>
-              <a:t>&gt;</a:t>
-            </a:r>
-          </a:p>
-          <a:p>
-            <a:r>
-              <a:rPr lang="en-US" sz="1600"/>
-              <a:t>  &lt;data expr="false" id="Gate_In.Block" </a:t>
-            </a:r>
-            <a:r>
-              <a:rPr lang="en-US" sz="1600">
+              <a:t>iumlb:refinement</a:t>
+            </a:r>
+            <a:r>
+              <a:rPr lang="en-US" dirty="0">
                 <a:solidFill>
                   <a:srgbClr val="FF0000"/>
                 </a:solidFill>
               </a:rPr>
-              <a:t>iumlb:type="BOOL"</a:t>
-            </a:r>
-            <a:r>
-              <a:rPr lang="en-US" sz="1600"/>
-              <a:t>/&gt;</a:t>
-            </a:r>
-          </a:p>
-          <a:p>
-            <a:r>
-              <a:rPr lang="en-US" sz="1600"/>
-              <a:t>&lt;/datamodel&gt;</a:t>
-            </a:r>
-          </a:p>
-          <a:p>
-            <a:r>
-              <a:rPr lang="en-US" sz="1600"/>
-              <a:t>&lt;!-- Other model details --&gt;</a:t>
-            </a:r>
-          </a:p>
-          <a:p>
-            <a:r>
-              <a:rPr lang="en-US" sz="1600"/>
-              <a:t>&lt;state id="BLOCKED"&gt;</a:t>
-            </a:r>
-          </a:p>
-          <a:p>
-            <a:r>
-              <a:rPr lang="en-US" sz="1600"/>
-              <a:t>  &lt;transition cond="[On_In.CardAccept==true]" target="UNBLOCKED"&gt;</a:t>
-            </a:r>
-          </a:p>
-          <a:p>
-            <a:r>
-              <a:rPr lang="en-US" sz="1600"/>
-              <a:t>    </a:t>
-            </a:r>
-            <a:r>
-              <a:rPr lang="en-US" sz="1600">
+              <a:t>="2"</a:t>
+            </a:r>
+            <a:r>
+              <a:rPr lang="en-US" dirty="0"/>
+              <a:t>&gt;</a:t>
+            </a:r>
+          </a:p>
+          <a:p>
+            <a:r>
+              <a:rPr lang="en-US" dirty="0"/>
+              <a:t>  &lt;data expr="false" id="</a:t>
+            </a:r>
+            <a:r>
+              <a:rPr lang="en-US" dirty="0" err="1"/>
+              <a:t>Gate_In.Block</a:t>
+            </a:r>
+            <a:r>
+              <a:rPr lang="en-US" dirty="0"/>
+              <a:t>" </a:t>
+            </a:r>
+            <a:r>
+              <a:rPr lang="en-US" dirty="0" err="1">
                 <a:solidFill>
                   <a:srgbClr val="FF0000"/>
                 </a:solidFill>
               </a:rPr>
-              <a:t>&lt;iumlb:guard name="gd1" predicate="On_In.CardAccept==true" refinement="2"/&gt;</a:t>
-            </a:r>
-          </a:p>
-          <a:p>
-            <a:r>
-              <a:rPr lang="en-US" sz="1600"/>
-              <a:t>    &lt;assign expr="true" location="Gate_In.Block" </a:t>
-            </a:r>
-            <a:r>
-              <a:rPr lang="en-US" sz="1600">
+              <a:t>iumlb:type</a:t>
+            </a:r>
+            <a:r>
+              <a:rPr lang="en-US" dirty="0">
                 <a:solidFill>
                   <a:srgbClr val="FF0000"/>
                 </a:solidFill>
               </a:rPr>
-              <a:t>iumlb:refinement="3"</a:t>
-            </a:r>
-            <a:r>
-              <a:rPr lang="en-US" sz="1600"/>
+              <a:t>="BOOL"</a:t>
+            </a:r>
+            <a:r>
+              <a:rPr lang="en-US" dirty="0"/>
               <a:t>/&gt;</a:t>
             </a:r>
           </a:p>
           <a:p>
             <a:r>
-              <a:rPr lang="en-US" sz="1600"/>
-              <a:t>  &lt;/transition&gt;</a:t>
-            </a:r>
-          </a:p>
-          <a:p>
-            <a:r>
-              <a:rPr lang="en-US" sz="1600"/>
-              <a:t>  &lt;onentry&gt;</a:t>
-            </a:r>
-          </a:p>
-          <a:p>
-            <a:r>
-              <a:rPr lang="en-US" sz="1600"/>
-              <a:t>    &lt;assign expr="true" location="Gate_In.Block"/&gt;</a:t>
-            </a:r>
-          </a:p>
-          <a:p>
-            <a:r>
-              <a:rPr lang="en-US" sz="1600"/>
-              <a:t>    &lt;assign expr="false" location="On_In.Reset"/&gt;</a:t>
-            </a:r>
-          </a:p>
-          <a:p>
-            <a:r>
-              <a:rPr lang="en-US" sz="1600"/>
-              <a:t>  &lt;/onentry&gt;</a:t>
-            </a:r>
-          </a:p>
-          <a:p>
-            <a:r>
-              <a:rPr lang="en-US" sz="1600"/>
-              <a:t>  &lt;onexit&gt;</a:t>
-            </a:r>
-          </a:p>
-          <a:p>
-            <a:r>
-              <a:rPr lang="en-US" sz="1600"/>
-              <a:t>    &lt;assign expr="false" location="Gate_In.Block"/&gt;</a:t>
-            </a:r>
-          </a:p>
-          <a:p>
-            <a:r>
-              <a:rPr lang="en-US" sz="1600"/>
-              <a:t>  &lt;/onexit&gt;</a:t>
-            </a:r>
-          </a:p>
-          <a:p>
-            <a:r>
-              <a:rPr lang="en-US" sz="1600"/>
-              <a:t>  </a:t>
-            </a:r>
-            <a:r>
-              <a:rPr lang="en-US" sz="1600">
+              <a:rPr lang="en-US" dirty="0"/>
+              <a:t>&lt;/</a:t>
+            </a:r>
+            <a:r>
+              <a:rPr lang="en-US" dirty="0" err="1"/>
+              <a:t>datamodel</a:t>
+            </a:r>
+            <a:r>
+              <a:rPr lang="en-US" dirty="0"/>
+              <a:t>&gt;</a:t>
+            </a:r>
+          </a:p>
+          <a:p>
+            <a:r>
+              <a:rPr lang="en-US" dirty="0"/>
+              <a:t>&lt;!-- Other model details --&gt;</a:t>
+            </a:r>
+          </a:p>
+          <a:p>
+            <a:r>
+              <a:rPr lang="en-US" dirty="0"/>
+              <a:t>&lt;state id="BLOCKED"&gt;</a:t>
+            </a:r>
+          </a:p>
+          <a:p>
+            <a:r>
+              <a:rPr lang="en-US" dirty="0"/>
+              <a:t>  &lt;transition </a:t>
+            </a:r>
+            <a:r>
+              <a:rPr lang="en-US" dirty="0" err="1"/>
+              <a:t>cond</a:t>
+            </a:r>
+            <a:r>
+              <a:rPr lang="en-US" dirty="0"/>
+              <a:t>="[</a:t>
+            </a:r>
+            <a:r>
+              <a:rPr lang="en-US" dirty="0" err="1"/>
+              <a:t>On_In.CardAccept</a:t>
+            </a:r>
+            <a:r>
+              <a:rPr lang="en-US" dirty="0"/>
+              <a:t>==true]" target="UNBLOCKED"&gt;</a:t>
+            </a:r>
+          </a:p>
+          <a:p>
+            <a:r>
+              <a:rPr lang="en-US" dirty="0"/>
+              <a:t>    </a:t>
+            </a:r>
+            <a:r>
+              <a:rPr lang="en-US" dirty="0">
                 <a:solidFill>
                   <a:srgbClr val="FF0000"/>
                 </a:solidFill>
               </a:rPr>
-              <a:t>&lt;iumlb:invariant predicate="Gate_In.Block == TRUE" name="GateCondition"/&gt;</a:t>
-            </a:r>
-          </a:p>
-          <a:p>
-            <a:r>
-              <a:rPr lang="en-US" sz="1600"/>
+              <a:t>&lt;</a:t>
+            </a:r>
+            <a:r>
+              <a:rPr lang="en-US" dirty="0" err="1">
+                <a:solidFill>
+                  <a:srgbClr val="FF0000"/>
+                </a:solidFill>
+              </a:rPr>
+              <a:t>iumlb:guard</a:t>
+            </a:r>
+            <a:r>
+              <a:rPr lang="en-US" dirty="0">
+                <a:solidFill>
+                  <a:srgbClr val="FF0000"/>
+                </a:solidFill>
+              </a:rPr>
+              <a:t> name="gd1" predicate="</a:t>
+            </a:r>
+            <a:r>
+              <a:rPr lang="en-US" dirty="0" err="1">
+                <a:solidFill>
+                  <a:srgbClr val="FF0000"/>
+                </a:solidFill>
+              </a:rPr>
+              <a:t>On_In.CardAccept</a:t>
+            </a:r>
+            <a:r>
+              <a:rPr lang="en-US" dirty="0">
+                <a:solidFill>
+                  <a:srgbClr val="FF0000"/>
+                </a:solidFill>
+              </a:rPr>
+              <a:t>==true" refinement="2"/&gt;</a:t>
+            </a:r>
+          </a:p>
+          <a:p>
+            <a:r>
+              <a:rPr lang="en-US" dirty="0"/>
+              <a:t>    &lt;assign expr="true" location="</a:t>
+            </a:r>
+            <a:r>
+              <a:rPr lang="en-US" dirty="0" err="1"/>
+              <a:t>Gate_In.Block</a:t>
+            </a:r>
+            <a:r>
+              <a:rPr lang="en-US" dirty="0"/>
+              <a:t>" </a:t>
+            </a:r>
+            <a:r>
+              <a:rPr lang="en-US" dirty="0" err="1">
+                <a:solidFill>
+                  <a:srgbClr val="FF0000"/>
+                </a:solidFill>
+              </a:rPr>
+              <a:t>iumlb:refinement</a:t>
+            </a:r>
+            <a:r>
+              <a:rPr lang="en-US" dirty="0">
+                <a:solidFill>
+                  <a:srgbClr val="FF0000"/>
+                </a:solidFill>
+              </a:rPr>
+              <a:t>="3"</a:t>
+            </a:r>
+            <a:r>
+              <a:rPr lang="en-US" dirty="0"/>
+              <a:t>/&gt;</a:t>
+            </a:r>
+          </a:p>
+          <a:p>
+            <a:r>
+              <a:rPr lang="en-US" dirty="0"/>
+              <a:t>  &lt;/transition&gt;</a:t>
+            </a:r>
+          </a:p>
+          <a:p>
+            <a:r>
+              <a:rPr lang="en-US" dirty="0"/>
+              <a:t>  &lt;</a:t>
+            </a:r>
+            <a:r>
+              <a:rPr lang="en-US" dirty="0" err="1"/>
+              <a:t>onentry</a:t>
+            </a:r>
+            <a:r>
+              <a:rPr lang="en-US" dirty="0"/>
+              <a:t>&gt;</a:t>
+            </a:r>
+          </a:p>
+          <a:p>
+            <a:r>
+              <a:rPr lang="en-US" dirty="0"/>
+              <a:t>    &lt;assign expr="true" location="</a:t>
+            </a:r>
+            <a:r>
+              <a:rPr lang="en-US" dirty="0" err="1"/>
+              <a:t>Gate_In.Block</a:t>
+            </a:r>
+            <a:r>
+              <a:rPr lang="en-US" dirty="0"/>
+              <a:t>"/&gt;</a:t>
+            </a:r>
+          </a:p>
+          <a:p>
+            <a:r>
+              <a:rPr lang="en-US" dirty="0"/>
+              <a:t>    &lt;assign expr="false" location="</a:t>
+            </a:r>
+            <a:r>
+              <a:rPr lang="en-US" dirty="0" err="1"/>
+              <a:t>On_In.Reset</a:t>
+            </a:r>
+            <a:r>
+              <a:rPr lang="en-US" dirty="0"/>
+              <a:t>"/&gt;</a:t>
+            </a:r>
+          </a:p>
+          <a:p>
+            <a:r>
+              <a:rPr lang="en-US" dirty="0"/>
+              <a:t>  &lt;/</a:t>
+            </a:r>
+            <a:r>
+              <a:rPr lang="en-US" dirty="0" err="1"/>
+              <a:t>onentry</a:t>
+            </a:r>
+            <a:r>
+              <a:rPr lang="en-US" dirty="0"/>
+              <a:t>&gt;</a:t>
+            </a:r>
+          </a:p>
+          <a:p>
+            <a:r>
+              <a:rPr lang="en-US" dirty="0"/>
+              <a:t>  &lt;</a:t>
+            </a:r>
+            <a:r>
+              <a:rPr lang="en-US" dirty="0" err="1"/>
+              <a:t>onexit</a:t>
+            </a:r>
+            <a:r>
+              <a:rPr lang="en-US" dirty="0"/>
+              <a:t>&gt;</a:t>
+            </a:r>
+          </a:p>
+          <a:p>
+            <a:r>
+              <a:rPr lang="en-US" dirty="0"/>
+              <a:t>    &lt;assign expr="false" location="</a:t>
+            </a:r>
+            <a:r>
+              <a:rPr lang="en-US" dirty="0" err="1"/>
+              <a:t>Gate_In.Block</a:t>
+            </a:r>
+            <a:r>
+              <a:rPr lang="en-US" dirty="0"/>
+              <a:t>"/&gt;</a:t>
+            </a:r>
+          </a:p>
+          <a:p>
+            <a:r>
+              <a:rPr lang="en-US" dirty="0"/>
+              <a:t>  &lt;/</a:t>
+            </a:r>
+            <a:r>
+              <a:rPr lang="en-US" dirty="0" err="1"/>
+              <a:t>onexit</a:t>
+            </a:r>
+            <a:r>
+              <a:rPr lang="en-US" dirty="0"/>
+              <a:t>&gt;</a:t>
+            </a:r>
+          </a:p>
+          <a:p>
+            <a:r>
+              <a:rPr lang="en-US" dirty="0"/>
+              <a:t>  </a:t>
+            </a:r>
+            <a:r>
+              <a:rPr lang="en-US" dirty="0">
+                <a:solidFill>
+                  <a:srgbClr val="FF0000"/>
+                </a:solidFill>
+              </a:rPr>
+              <a:t>&lt;</a:t>
+            </a:r>
+            <a:r>
+              <a:rPr lang="en-US" dirty="0" err="1">
+                <a:solidFill>
+                  <a:srgbClr val="FF0000"/>
+                </a:solidFill>
+              </a:rPr>
+              <a:t>iumlb:invariant</a:t>
+            </a:r>
+            <a:r>
+              <a:rPr lang="en-US" dirty="0">
+                <a:solidFill>
+                  <a:srgbClr val="FF0000"/>
+                </a:solidFill>
+              </a:rPr>
+              <a:t> predicate="</a:t>
+            </a:r>
+            <a:r>
+              <a:rPr lang="en-US" dirty="0" err="1">
+                <a:solidFill>
+                  <a:srgbClr val="FF0000"/>
+                </a:solidFill>
+              </a:rPr>
+              <a:t>Gate_In.Block</a:t>
+            </a:r>
+            <a:r>
+              <a:rPr lang="en-US" dirty="0">
+                <a:solidFill>
+                  <a:srgbClr val="FF0000"/>
+                </a:solidFill>
+              </a:rPr>
+              <a:t> == TRUE" name="</a:t>
+            </a:r>
+            <a:r>
+              <a:rPr lang="en-US" dirty="0" err="1">
+                <a:solidFill>
+                  <a:srgbClr val="FF0000"/>
+                </a:solidFill>
+              </a:rPr>
+              <a:t>GateCondition</a:t>
+            </a:r>
+            <a:r>
+              <a:rPr lang="en-US" dirty="0">
+                <a:solidFill>
+                  <a:srgbClr val="FF0000"/>
+                </a:solidFill>
+              </a:rPr>
+              <a:t>"/&gt;</a:t>
+            </a:r>
+          </a:p>
+          <a:p>
+            <a:r>
+              <a:rPr lang="en-US" dirty="0"/>
               <a:t>&lt;/state&gt; </a:t>
             </a:r>
           </a:p>
@@ -4893,7 +5346,7 @@
 </p:sld>
 </file>
 
-<file path=ppt/slides/slide12.xml><?xml version="1.0" encoding="utf-8"?>
+<file path=ppt/slides/slide13.xml><?xml version="1.0" encoding="utf-8"?>
 <p:sld xmlns:a="http://schemas.openxmlformats.org/drawingml/2006/main" xmlns:r="http://schemas.openxmlformats.org/officeDocument/2006/relationships" xmlns:p="http://schemas.openxmlformats.org/presentationml/2006/main">
   <p:cSld>
     <p:spTree>
@@ -5057,7 +5510,7 @@
 </p:sld>
 </file>
 
-<file path=ppt/slides/slide13.xml><?xml version="1.0" encoding="utf-8"?>
+<file path=ppt/slides/slide14.xml><?xml version="1.0" encoding="utf-8"?>
 <p:sld xmlns:a="http://schemas.openxmlformats.org/drawingml/2006/main" xmlns:r="http://schemas.openxmlformats.org/officeDocument/2006/relationships" xmlns:p="http://schemas.openxmlformats.org/presentationml/2006/main">
   <p:cSld>
     <p:spTree>
@@ -5149,7 +5602,7 @@
 </p:sld>
 </file>
 
-<file path=ppt/slides/slide14.xml><?xml version="1.0" encoding="utf-8"?>
+<file path=ppt/slides/slide15.xml><?xml version="1.0" encoding="utf-8"?>
 <p:sld xmlns:a="http://schemas.openxmlformats.org/drawingml/2006/main" xmlns:r="http://schemas.openxmlformats.org/officeDocument/2006/relationships" xmlns:p="http://schemas.openxmlformats.org/presentationml/2006/main">
   <p:cSld>
     <p:spTree>
@@ -5232,112 +5685,6 @@
 </p:sld>
 </file>
 
-<file path=ppt/slides/slide15.xml><?xml version="1.0" encoding="utf-8"?>
-<p:sld xmlns:a="http://schemas.openxmlformats.org/drawingml/2006/main" xmlns:r="http://schemas.openxmlformats.org/officeDocument/2006/relationships" xmlns:p="http://schemas.openxmlformats.org/presentationml/2006/main">
-  <p:cSld>
-    <p:spTree>
-      <p:nvGrpSpPr>
-        <p:cNvPr id="1" name=""/>
-        <p:cNvGrpSpPr/>
-        <p:nvPr/>
-      </p:nvGrpSpPr>
-      <p:grpSpPr>
-        <a:xfrm>
-          <a:off x="0" y="0"/>
-          <a:ext cx="0" cy="0"/>
-          <a:chOff x="0" y="0"/>
-          <a:chExt cx="0" cy="0"/>
-        </a:xfrm>
-      </p:grpSpPr>
-      <p:sp>
-        <p:nvSpPr>
-          <p:cNvPr id="2" name="Title 1"/>
-          <p:cNvSpPr>
-            <a:spLocks noGrp="1"/>
-          </p:cNvSpPr>
-          <p:nvPr>
-            <p:ph type="title"/>
-          </p:nvPr>
-        </p:nvSpPr>
-        <p:spPr/>
-        <p:txBody>
-          <a:bodyPr/>
-          <a:lstStyle/>
-          <a:p>
-            <a:r>
-              <a:rPr lang="en-US"/>
-              <a:t>Next steps</a:t>
-            </a:r>
-          </a:p>
-        </p:txBody>
-      </p:sp>
-      <p:sp>
-        <p:nvSpPr>
-          <p:cNvPr id="3" name="Content Placeholder 2"/>
-          <p:cNvSpPr>
-            <a:spLocks noGrp="1"/>
-          </p:cNvSpPr>
-          <p:nvPr>
-            <p:ph idx="1"/>
-          </p:nvPr>
-        </p:nvSpPr>
-        <p:spPr/>
-        <p:txBody>
-          <a:bodyPr/>
-          <a:lstStyle/>
-          <a:p>
-            <a:r>
-              <a:rPr lang="en-US"/>
-              <a:t>Try modelling the run to completion semantics</a:t>
-            </a:r>
-          </a:p>
-          <a:p>
-            <a:r>
-              <a:rPr lang="en-US"/>
-              <a:t>E.g. trigger events create a token, </a:t>
-            </a:r>
-          </a:p>
-          <a:p>
-            <a:pPr lvl="1"/>
-            <a:r>
-              <a:rPr lang="en-US"/>
-              <a:t>A new token can only be consumed when no transitions are enabled</a:t>
-            </a:r>
-          </a:p>
-          <a:p>
-            <a:r>
-              <a:rPr lang="en-US"/>
-              <a:t>Try enforcing transition run-to-completion sequences</a:t>
-            </a:r>
-          </a:p>
-          <a:p>
-            <a:r>
-              <a:rPr lang="en-US" i="1">
-                <a:solidFill>
-                  <a:srgbClr val="FF0000"/>
-                </a:solidFill>
-              </a:rPr>
-              <a:t>Still omit sequencing of actions</a:t>
-            </a:r>
-          </a:p>
-          <a:p>
-            <a:endParaRPr lang="en-US"/>
-          </a:p>
-        </p:txBody>
-      </p:sp>
-    </p:spTree>
-    <p:extLst>
-      <p:ext uri="{BB962C8B-B14F-4D97-AF65-F5344CB8AC3E}">
-        <p14:creationId xmlns:p14="http://schemas.microsoft.com/office/powerpoint/2010/main" val="3358225415"/>
-      </p:ext>
-    </p:extLst>
-  </p:cSld>
-  <p:clrMapOvr>
-    <a:masterClrMapping/>
-  </p:clrMapOvr>
-</p:sld>
-</file>
-
 <file path=ppt/slides/slide16.xml><?xml version="1.0" encoding="utf-8"?>
 <p:sld xmlns:a="http://schemas.openxmlformats.org/drawingml/2006/main" xmlns:r="http://schemas.openxmlformats.org/officeDocument/2006/relationships" xmlns:p="http://schemas.openxmlformats.org/presentationml/2006/main">
   <p:cSld>
@@ -5367,14 +5714,12 @@
         </p:nvSpPr>
         <p:spPr/>
         <p:txBody>
-          <a:bodyPr>
-            <a:normAutofit/>
-          </a:bodyPr>
+          <a:bodyPr/>
           <a:lstStyle/>
           <a:p>
             <a:r>
               <a:rPr lang="en-US"/>
-              <a:t>Enhance iUML-B to support triggers </a:t>
+              <a:t>Next steps</a:t>
             </a:r>
           </a:p>
         </p:txBody>
@@ -5391,158 +5736,65 @@
         </p:nvSpPr>
         <p:spPr/>
         <p:txBody>
-          <a:bodyPr>
-            <a:normAutofit fontScale="70000" lnSpcReduction="20000"/>
-          </a:bodyPr>
+          <a:bodyPr/>
           <a:lstStyle/>
           <a:p>
-            <a:pPr lvl="0"/>
-            <a:r>
-              <a:rPr lang="en-GB"/>
-              <a:t>iUML-B Statemachines will own a collection of triggers.  </a:t>
+            <a:r>
+              <a:rPr lang="en-US" dirty="0"/>
+              <a:t>Try modelling the run to completion semantics</a:t>
+            </a:r>
+          </a:p>
+          <a:p>
+            <a:r>
+              <a:rPr lang="en-US" dirty="0"/>
+              <a:t>E.g. trigger events create a token, </a:t>
             </a:r>
           </a:p>
           <a:p>
             <a:pPr lvl="1"/>
             <a:r>
-              <a:rPr lang="en-GB"/>
-              <a:t>Each trigger will generate an Event-B BOOL variable.</a:t>
-            </a:r>
-          </a:p>
-          <a:p>
-            <a:pPr lvl="2"/>
-            <a:r>
-              <a:rPr lang="en-GB"/>
-              <a:t> (Note simplification of SCXML, which permits several triggers of a kind to be queued). </a:t>
-            </a:r>
-          </a:p>
-          <a:p>
-            <a:pPr lvl="1"/>
-            <a:r>
-              <a:rPr lang="en-GB"/>
-              <a:t>Transitions may reference a trigger. </a:t>
-            </a:r>
-          </a:p>
-          <a:p>
-            <a:pPr lvl="2"/>
-            <a:r>
-              <a:rPr lang="en-GB"/>
-              <a:t>The reference will generate a guard, </a:t>
-            </a:r>
-            <a:r>
-              <a:rPr lang="en-GB" i="1"/>
-              <a:t>&lt;trigger variable&gt; = TRUE</a:t>
-            </a:r>
-            <a:r>
-              <a:rPr lang="en-GB"/>
-              <a:t> </a:t>
-            </a:r>
-          </a:p>
-          <a:p>
-            <a:pPr lvl="2"/>
-            <a:r>
-              <a:rPr lang="en-GB"/>
-              <a:t>And an action </a:t>
-            </a:r>
-            <a:r>
-              <a:rPr lang="en-GB" i="1"/>
-              <a:t>&lt;trigger variable&gt; :=  FALSE</a:t>
-            </a:r>
-            <a:r>
-              <a:rPr lang="en-GB"/>
-              <a:t>. </a:t>
-            </a:r>
-          </a:p>
-          <a:p>
-            <a:pPr lvl="1"/>
-            <a:r>
-              <a:rPr lang="en-GB"/>
-              <a:t>Transitions may own a collection of ‘Raise’ actions that reference an internal trigger. </a:t>
-            </a:r>
-          </a:p>
-          <a:p>
-            <a:pPr lvl="2"/>
-            <a:r>
-              <a:rPr lang="en-GB"/>
-              <a:t>This will generate an action </a:t>
-            </a:r>
-            <a:r>
-              <a:rPr lang="en-GB" i="1"/>
-              <a:t>&lt;trigger variable&gt; :=  TRUE.</a:t>
-            </a:r>
-            <a:r>
-              <a:rPr lang="en-GB"/>
-              <a:t> </a:t>
-            </a:r>
-          </a:p>
-          <a:p>
-            <a:pPr lvl="1"/>
-            <a:r>
-              <a:rPr lang="en-GB"/>
-              <a:t>Transitions may be designated as external. </a:t>
-            </a:r>
-          </a:p>
-          <a:p>
-            <a:pPr lvl="2"/>
-            <a:r>
-              <a:rPr lang="en-GB"/>
-              <a:t>An interface event will be generated to create a new trigger </a:t>
-            </a:r>
-            <a:r>
-              <a:rPr lang="en-GB" i="1"/>
-              <a:t>( &lt;trigger variable&gt; :=  TRUE )</a:t>
-            </a:r>
-          </a:p>
-          <a:p>
-            <a:pPr lvl="2"/>
-            <a:r>
-              <a:rPr lang="en-GB"/>
-              <a:t>when it has been consumed </a:t>
-            </a:r>
-            <a:r>
-              <a:rPr lang="en-GB" i="1"/>
-              <a:t>( &lt;trigger variable&gt; = FALSE ) and </a:t>
-            </a:r>
-          </a:p>
-          <a:p>
-            <a:pPr lvl="2"/>
-            <a:r>
-              <a:rPr lang="en-GB" i="1"/>
-              <a:t>No transitions are enabled</a:t>
-            </a:r>
-            <a:r>
-              <a:rPr lang="en-GB"/>
-              <a:t>. </a:t>
-            </a:r>
-            <a:r>
-              <a:rPr lang="en-GB" i="1"/>
-              <a:t>(run to completion)</a:t>
-            </a:r>
-          </a:p>
-          <a:p>
-            <a:pPr lvl="2"/>
-            <a:endParaRPr lang="en-GB" i="1"/>
-          </a:p>
-          <a:p>
-            <a:pPr lvl="0"/>
-            <a:r>
-              <a:rPr lang="en-GB"/>
-              <a:t>A partial ‘run-to-completion’ semantics will be introduced by disabling all interface events while any external or internal transition is enabled. </a:t>
-            </a:r>
-            <a:endParaRPr lang="en-US"/>
+              <a:rPr lang="en-US" dirty="0"/>
+              <a:t>A new token can only be consumed when no transitions are enabled</a:t>
+            </a:r>
+          </a:p>
+          <a:p>
+            <a:r>
+              <a:rPr lang="en-US" dirty="0"/>
+              <a:t>Try enforcing transition run-to-completion sequences</a:t>
+            </a:r>
+          </a:p>
+          <a:p>
+            <a:r>
+              <a:rPr lang="en-US" i="1" dirty="0">
+                <a:solidFill>
+                  <a:srgbClr val="FF0000"/>
+                </a:solidFill>
+              </a:rPr>
+              <a:t>Still omit sequencing of actions</a:t>
+            </a:r>
+          </a:p>
+          <a:p>
+            <a:endParaRPr lang="en-US" dirty="0"/>
           </a:p>
         </p:txBody>
       </p:sp>
     </p:spTree>
     <p:extLst>
       <p:ext uri="{BB962C8B-B14F-4D97-AF65-F5344CB8AC3E}">
-        <p14:creationId xmlns:p14="http://schemas.microsoft.com/office/powerpoint/2010/main" val="383277120"/>
+        <p14:creationId xmlns:p14="http://schemas.microsoft.com/office/powerpoint/2010/main" val="3358225415"/>
       </p:ext>
     </p:extLst>
   </p:cSld>
   <p:clrMapOvr>
     <a:masterClrMapping/>
   </p:clrMapOvr>
+  <p:timing>
+    <p:tnLst>
+      <p:par>
+        <p:cTn id="1" dur="indefinite" restart="never" nodeType="tmRoot"/>
+      </p:par>
+    </p:tnLst>
+  </p:timing>
 </p:sld>
 </file>
 
@@ -5575,274 +5827,194 @@
         </p:nvSpPr>
         <p:spPr/>
         <p:txBody>
-          <a:bodyPr/>
+          <a:bodyPr>
+            <a:normAutofit/>
+          </a:bodyPr>
           <a:lstStyle/>
           <a:p>
             <a:r>
               <a:rPr lang="en-US"/>
-              <a:t>External Trigger Event</a:t>
-            </a:r>
-          </a:p>
-        </p:txBody>
-      </p:sp>
-      <p:pic>
-        <p:nvPicPr>
-          <p:cNvPr id="4" name="Picture 3"/>
-          <p:cNvPicPr/>
-          <p:nvPr/>
-        </p:nvPicPr>
-        <p:blipFill>
-          <a:blip r:embed="rId2">
-            <a:extLst>
-              <a:ext uri="{28A0092B-C50C-407E-A947-70E740481C1C}">
-                <a14:useLocalDpi xmlns:a14="http://schemas.microsoft.com/office/drawing/2010/main" val="0"/>
-              </a:ext>
-            </a:extLst>
-          </a:blip>
-          <a:srcRect/>
-          <a:stretch>
-            <a:fillRect/>
-          </a:stretch>
-        </p:blipFill>
-        <p:spPr bwMode="auto">
-          <a:xfrm>
-            <a:off x="311150" y="2231000"/>
-            <a:ext cx="5140045" cy="3529040"/>
-          </a:xfrm>
-          <a:prstGeom prst="rect">
-            <a:avLst/>
-          </a:prstGeom>
-          <a:noFill/>
-          <a:ln>
-            <a:noFill/>
-          </a:ln>
-        </p:spPr>
-      </p:pic>
-      <p:sp>
-        <p:nvSpPr>
-          <p:cNvPr id="5" name="TextBox 4"/>
-          <p:cNvSpPr txBox="1"/>
-          <p:nvPr/>
+              <a:t>Enhance iUML-B to support triggers </a:t>
+            </a:r>
+          </a:p>
+        </p:txBody>
+      </p:sp>
+      <p:sp>
+        <p:nvSpPr>
+          <p:cNvPr id="3" name="Content Placeholder 2"/>
+          <p:cNvSpPr>
+            <a:spLocks noGrp="1"/>
+          </p:cNvSpPr>
+          <p:nvPr>
+            <p:ph idx="1"/>
+          </p:nvPr>
         </p:nvSpPr>
         <p:spPr>
           <a:xfrm>
-            <a:off x="5798237" y="1861668"/>
-            <a:ext cx="3345763" cy="369332"/>
+            <a:off x="311150" y="649288"/>
+            <a:ext cx="8496300" cy="4114800"/>
           </a:xfrm>
-          <a:prstGeom prst="rect">
-            <a:avLst/>
-          </a:prstGeom>
-          <a:noFill/>
         </p:spPr>
         <p:txBody>
-          <a:bodyPr wrap="none" rtlCol="0">
-            <a:spAutoFit/>
+          <a:bodyPr>
+            <a:noAutofit/>
           </a:bodyPr>
           <a:lstStyle/>
           <a:p>
-            <a:r>
-              <a:rPr lang="en-US"/>
-              <a:t>Old trigger has been consumed</a:t>
-            </a:r>
-          </a:p>
-        </p:txBody>
-      </p:sp>
-      <p:cxnSp>
-        <p:nvCxnSpPr>
-          <p:cNvPr id="6" name="Straight Arrow Connector 5"/>
-          <p:cNvCxnSpPr/>
-          <p:nvPr/>
-        </p:nvCxnSpPr>
-        <p:spPr>
-          <a:xfrm flipH="1">
-            <a:off x="3404709" y="2008564"/>
-            <a:ext cx="2234091" cy="897500"/>
-          </a:xfrm>
-          <a:prstGeom prst="straightConnector1">
-            <a:avLst/>
-          </a:prstGeom>
-          <a:ln>
-            <a:tailEnd type="arrow"/>
-          </a:ln>
-        </p:spPr>
-        <p:style>
-          <a:lnRef idx="2">
-            <a:schemeClr val="accent1"/>
-          </a:lnRef>
-          <a:fillRef idx="0">
-            <a:schemeClr val="accent1"/>
-          </a:fillRef>
-          <a:effectRef idx="1">
-            <a:schemeClr val="accent1"/>
-          </a:effectRef>
-          <a:fontRef idx="minor">
-            <a:schemeClr val="tx1"/>
-          </a:fontRef>
-        </p:style>
-      </p:cxnSp>
-      <p:sp>
-        <p:nvSpPr>
-          <p:cNvPr id="7" name="TextBox 6"/>
-          <p:cNvSpPr txBox="1"/>
-          <p:nvPr/>
-        </p:nvSpPr>
-        <p:spPr>
-          <a:xfrm>
-            <a:off x="5556937" y="5430368"/>
-            <a:ext cx="1954569" cy="369332"/>
-          </a:xfrm>
-          <a:prstGeom prst="rect">
-            <a:avLst/>
-          </a:prstGeom>
-          <a:noFill/>
-        </p:spPr>
-        <p:txBody>
-          <a:bodyPr wrap="none" rtlCol="0">
-            <a:spAutoFit/>
-          </a:bodyPr>
-          <a:lstStyle/>
-          <a:p>
-            <a:r>
-              <a:rPr lang="en-US"/>
-              <a:t>Raise new trigger</a:t>
-            </a:r>
-          </a:p>
-        </p:txBody>
-      </p:sp>
-      <p:cxnSp>
-        <p:nvCxnSpPr>
-          <p:cNvPr id="8" name="Straight Arrow Connector 7"/>
-          <p:cNvCxnSpPr>
-            <a:stCxn id="7" idx="1"/>
-          </p:cNvCxnSpPr>
-          <p:nvPr/>
-        </p:nvCxnSpPr>
-        <p:spPr>
-          <a:xfrm flipH="1" flipV="1">
-            <a:off x="2717800" y="5302436"/>
-            <a:ext cx="2839137" cy="312598"/>
-          </a:xfrm>
-          <a:prstGeom prst="straightConnector1">
-            <a:avLst/>
-          </a:prstGeom>
-          <a:ln>
-            <a:tailEnd type="arrow"/>
-          </a:ln>
-        </p:spPr>
-        <p:style>
-          <a:lnRef idx="2">
-            <a:schemeClr val="accent1"/>
-          </a:lnRef>
-          <a:fillRef idx="0">
-            <a:schemeClr val="accent1"/>
-          </a:fillRef>
-          <a:effectRef idx="1">
-            <a:schemeClr val="accent1"/>
-          </a:effectRef>
-          <a:fontRef idx="minor">
-            <a:schemeClr val="tx1"/>
-          </a:fontRef>
-        </p:style>
-      </p:cxnSp>
-      <p:sp>
-        <p:nvSpPr>
-          <p:cNvPr id="10" name="TextBox 9"/>
-          <p:cNvSpPr txBox="1"/>
-          <p:nvPr/>
-        </p:nvSpPr>
-        <p:spPr>
-          <a:xfrm>
-            <a:off x="5887137" y="4007968"/>
-            <a:ext cx="2503472" cy="369332"/>
-          </a:xfrm>
-          <a:prstGeom prst="rect">
-            <a:avLst/>
-          </a:prstGeom>
-          <a:noFill/>
-        </p:spPr>
-        <p:txBody>
-          <a:bodyPr wrap="none" rtlCol="0">
-            <a:spAutoFit/>
-          </a:bodyPr>
-          <a:lstStyle/>
-          <a:p>
-            <a:r>
-              <a:rPr lang="en-US"/>
-              <a:t>No transitions enabled</a:t>
-            </a:r>
-          </a:p>
-        </p:txBody>
-      </p:sp>
-      <p:sp>
-        <p:nvSpPr>
-          <p:cNvPr id="11" name="Right Brace 10"/>
-          <p:cNvSpPr/>
-          <p:nvPr/>
-        </p:nvSpPr>
-        <p:spPr bwMode="auto">
-          <a:xfrm>
-            <a:off x="5245100" y="3033996"/>
-            <a:ext cx="393700" cy="1969804"/>
-          </a:xfrm>
-          <a:prstGeom prst="rightBrace">
-            <a:avLst/>
-          </a:prstGeom>
-          <a:noFill/>
-          <a:ln w="38100" cap="flat" cmpd="sng" algn="ctr">
-            <a:solidFill>
-              <a:schemeClr val="tx1"/>
-            </a:solidFill>
-            <a:prstDash val="solid"/>
-            <a:round/>
-            <a:headEnd type="none" w="med" len="med"/>
-            <a:tailEnd type="none" w="med" len="med"/>
-          </a:ln>
-          <a:effectLst/>
-        </p:spPr>
-        <p:txBody>
-          <a:bodyPr vert="horz" wrap="square" lIns="91440" tIns="45720" rIns="91440" bIns="0" numCol="1" rtlCol="0" anchor="t" anchorCtr="0" compatLnSpc="1">
-            <a:prstTxWarp prst="textNoShape">
-              <a:avLst/>
-            </a:prstTxWarp>
-            <a:spAutoFit/>
-          </a:bodyPr>
-          <a:lstStyle/>
-          <a:p>
-            <a:pPr marL="0" marR="0" indent="0" algn="ctr" defTabSz="914400" rtl="0" eaLnBrk="0" fontAlgn="base" latinLnBrk="0" hangingPunct="0">
-              <a:lnSpc>
-                <a:spcPct val="100000"/>
-              </a:lnSpc>
-              <a:spcBef>
-                <a:spcPct val="0"/>
-              </a:spcBef>
-              <a:spcAft>
-                <a:spcPct val="0"/>
-              </a:spcAft>
-              <a:buClrTx/>
-              <a:buSzTx/>
-              <a:buFontTx/>
-              <a:buNone/>
-              <a:tabLst/>
-            </a:pPr>
-            <a:endParaRPr kumimoji="0" lang="en-US" sz="1200" b="0" i="0" u="none" strike="noStrike" cap="none" normalizeH="0" baseline="0">
-              <a:ln>
-                <a:noFill/>
-              </a:ln>
-              <a:solidFill>
-                <a:schemeClr val="tx1"/>
-              </a:solidFill>
-              <a:effectLst/>
-              <a:latin typeface="Lucida Sans" charset="0"/>
-              <a:ea typeface="ＭＳ Ｐゴシック" charset="-128"/>
-              <a:cs typeface="ＭＳ Ｐゴシック" charset="-128"/>
-            </a:endParaRPr>
+            <a:pPr lvl="0"/>
+            <a:r>
+              <a:rPr lang="en-GB" sz="2000" dirty="0" err="1"/>
+              <a:t>iUML</a:t>
+            </a:r>
+            <a:r>
+              <a:rPr lang="en-GB" sz="2000" dirty="0"/>
+              <a:t>-B </a:t>
+            </a:r>
+            <a:r>
+              <a:rPr lang="en-GB" sz="2000" dirty="0" err="1"/>
+              <a:t>Statemachines</a:t>
+            </a:r>
+            <a:r>
+              <a:rPr lang="en-GB" sz="2000" dirty="0"/>
+              <a:t> will own a collection of triggers.  </a:t>
+            </a:r>
+          </a:p>
+          <a:p>
+            <a:pPr lvl="1"/>
+            <a:r>
+              <a:rPr lang="en-GB" sz="1800" dirty="0"/>
+              <a:t>Each trigger will generate an Event-B BOOL variable.</a:t>
+            </a:r>
+          </a:p>
+          <a:p>
+            <a:pPr lvl="2"/>
+            <a:r>
+              <a:rPr lang="en-GB" sz="1600" dirty="0"/>
+              <a:t> (Note simplification of SCXML, which permits several triggers of a kind to be queued). </a:t>
+            </a:r>
+          </a:p>
+          <a:p>
+            <a:pPr lvl="1"/>
+            <a:r>
+              <a:rPr lang="en-GB" sz="1800" dirty="0"/>
+              <a:t>Transitions may reference a trigger. </a:t>
+            </a:r>
+          </a:p>
+          <a:p>
+            <a:pPr lvl="2"/>
+            <a:r>
+              <a:rPr lang="en-GB" sz="1600" dirty="0"/>
+              <a:t>The reference will generate a guard, </a:t>
+            </a:r>
+            <a:r>
+              <a:rPr lang="en-GB" sz="1600" i="1" dirty="0"/>
+              <a:t>&lt;trigger variable&gt; = TRUE</a:t>
+            </a:r>
+            <a:r>
+              <a:rPr lang="en-GB" sz="1600" dirty="0"/>
+              <a:t> </a:t>
+            </a:r>
+          </a:p>
+          <a:p>
+            <a:pPr lvl="2"/>
+            <a:r>
+              <a:rPr lang="en-GB" sz="1600" dirty="0"/>
+              <a:t>And an action </a:t>
+            </a:r>
+            <a:r>
+              <a:rPr lang="en-GB" sz="1600" i="1" dirty="0"/>
+              <a:t>&lt;trigger variable&gt; :=  FALSE</a:t>
+            </a:r>
+            <a:r>
+              <a:rPr lang="en-GB" sz="1600" dirty="0"/>
+              <a:t>. </a:t>
+            </a:r>
+          </a:p>
+          <a:p>
+            <a:pPr lvl="1"/>
+            <a:r>
+              <a:rPr lang="en-GB" sz="1800" dirty="0"/>
+              <a:t>Transitions may own a collection of ‘Raise’ actions that reference an internal trigger. </a:t>
+            </a:r>
+          </a:p>
+          <a:p>
+            <a:pPr lvl="2"/>
+            <a:r>
+              <a:rPr lang="en-GB" sz="1600" dirty="0"/>
+              <a:t>This will generate an action </a:t>
+            </a:r>
+            <a:r>
+              <a:rPr lang="en-GB" sz="1600" i="1" dirty="0"/>
+              <a:t>&lt;trigger variable&gt; :=  TRUE.</a:t>
+            </a:r>
+            <a:r>
+              <a:rPr lang="en-GB" sz="1600" dirty="0"/>
+              <a:t> </a:t>
+            </a:r>
+          </a:p>
+          <a:p>
+            <a:pPr lvl="1"/>
+            <a:r>
+              <a:rPr lang="en-GB" sz="1800" dirty="0"/>
+              <a:t>Transitions may be designated as external. </a:t>
+            </a:r>
+          </a:p>
+          <a:p>
+            <a:pPr lvl="2"/>
+            <a:r>
+              <a:rPr lang="en-GB" sz="1600" dirty="0"/>
+              <a:t>An interface event will be generated to create a new trigger </a:t>
+            </a:r>
+            <a:r>
+              <a:rPr lang="en-GB" sz="1600" i="1" dirty="0"/>
+              <a:t>( &lt;trigger variable&gt; :=  TRUE )</a:t>
+            </a:r>
+          </a:p>
+          <a:p>
+            <a:pPr lvl="2"/>
+            <a:r>
+              <a:rPr lang="en-GB" sz="1600" dirty="0"/>
+              <a:t>when it has been consumed </a:t>
+            </a:r>
+            <a:r>
+              <a:rPr lang="en-GB" sz="1600" i="1" dirty="0"/>
+              <a:t>( &lt;trigger variable&gt; = FALSE ) and </a:t>
+            </a:r>
+          </a:p>
+          <a:p>
+            <a:pPr lvl="2"/>
+            <a:r>
+              <a:rPr lang="en-GB" sz="1600" i="1" dirty="0"/>
+              <a:t>No transitions are enabled</a:t>
+            </a:r>
+            <a:r>
+              <a:rPr lang="en-GB" sz="1600" dirty="0"/>
+              <a:t>. </a:t>
+            </a:r>
+            <a:r>
+              <a:rPr lang="en-GB" sz="1600" i="1" dirty="0"/>
+              <a:t>(run to completion</a:t>
+            </a:r>
+            <a:r>
+              <a:rPr lang="en-GB" sz="1600" i="1" dirty="0" smtClean="0"/>
+              <a:t>)</a:t>
+            </a:r>
+            <a:endParaRPr lang="en-GB" sz="1600" i="1" dirty="0"/>
+          </a:p>
+          <a:p>
+            <a:pPr lvl="0"/>
+            <a:r>
+              <a:rPr lang="en-GB" sz="2000" dirty="0"/>
+              <a:t>A partial ‘run-to-completion’ semantics will be introduced by disabling all interface events while any external or internal transition is enabled. </a:t>
+            </a:r>
+            <a:endParaRPr lang="en-US" sz="2000" dirty="0"/>
           </a:p>
         </p:txBody>
       </p:sp>
     </p:spTree>
     <p:extLst>
       <p:ext uri="{BB962C8B-B14F-4D97-AF65-F5344CB8AC3E}">
-        <p14:creationId xmlns:p14="http://schemas.microsoft.com/office/powerpoint/2010/main" val="3695732330"/>
+        <p14:creationId xmlns:p14="http://schemas.microsoft.com/office/powerpoint/2010/main" val="383277120"/>
       </p:ext>
     </p:extLst>
   </p:cSld>
@@ -5893,6 +6065,319 @@
           <a:p>
             <a:r>
               <a:rPr lang="en-US"/>
+              <a:t>External Trigger Event</a:t>
+            </a:r>
+          </a:p>
+        </p:txBody>
+      </p:sp>
+      <p:pic>
+        <p:nvPicPr>
+          <p:cNvPr id="4" name="Picture 3"/>
+          <p:cNvPicPr/>
+          <p:nvPr/>
+        </p:nvPicPr>
+        <p:blipFill>
+          <a:blip r:embed="rId2">
+            <a:extLst>
+              <a:ext uri="{28A0092B-C50C-407E-A947-70E740481C1C}">
+                <a14:useLocalDpi xmlns:a14="http://schemas.microsoft.com/office/drawing/2010/main" val="0"/>
+              </a:ext>
+            </a:extLst>
+          </a:blip>
+          <a:srcRect/>
+          <a:stretch>
+            <a:fillRect/>
+          </a:stretch>
+        </p:blipFill>
+        <p:spPr bwMode="auto">
+          <a:xfrm>
+            <a:off x="99243" y="1381919"/>
+            <a:ext cx="5342707" cy="4334196"/>
+          </a:xfrm>
+          <a:prstGeom prst="rect">
+            <a:avLst/>
+          </a:prstGeom>
+          <a:noFill/>
+          <a:ln>
+            <a:noFill/>
+          </a:ln>
+        </p:spPr>
+      </p:pic>
+      <p:sp>
+        <p:nvSpPr>
+          <p:cNvPr id="5" name="TextBox 4"/>
+          <p:cNvSpPr txBox="1"/>
+          <p:nvPr/>
+        </p:nvSpPr>
+        <p:spPr>
+          <a:xfrm>
+            <a:off x="5145437" y="1771076"/>
+            <a:ext cx="3700052" cy="400110"/>
+          </a:xfrm>
+          <a:prstGeom prst="rect">
+            <a:avLst/>
+          </a:prstGeom>
+          <a:noFill/>
+        </p:spPr>
+        <p:txBody>
+          <a:bodyPr wrap="none" rtlCol="0">
+            <a:spAutoFit/>
+          </a:bodyPr>
+          <a:lstStyle/>
+          <a:p>
+            <a:r>
+              <a:rPr lang="en-US" sz="2000"/>
+              <a:t>Old trigger has been consumed</a:t>
+            </a:r>
+          </a:p>
+        </p:txBody>
+      </p:sp>
+      <p:cxnSp>
+        <p:nvCxnSpPr>
+          <p:cNvPr id="6" name="Straight Arrow Connector 5"/>
+          <p:cNvCxnSpPr/>
+          <p:nvPr/>
+        </p:nvCxnSpPr>
+        <p:spPr>
+          <a:xfrm flipH="1">
+            <a:off x="3146156" y="2061723"/>
+            <a:ext cx="1999281" cy="200055"/>
+          </a:xfrm>
+          <a:prstGeom prst="straightConnector1">
+            <a:avLst/>
+          </a:prstGeom>
+          <a:ln>
+            <a:tailEnd type="arrow"/>
+          </a:ln>
+        </p:spPr>
+        <p:style>
+          <a:lnRef idx="2">
+            <a:schemeClr val="accent1"/>
+          </a:lnRef>
+          <a:fillRef idx="0">
+            <a:schemeClr val="accent1"/>
+          </a:fillRef>
+          <a:effectRef idx="1">
+            <a:schemeClr val="accent1"/>
+          </a:effectRef>
+          <a:fontRef idx="minor">
+            <a:schemeClr val="tx1"/>
+          </a:fontRef>
+        </p:style>
+      </p:cxnSp>
+      <p:sp>
+        <p:nvSpPr>
+          <p:cNvPr id="7" name="TextBox 6"/>
+          <p:cNvSpPr txBox="1"/>
+          <p:nvPr/>
+        </p:nvSpPr>
+        <p:spPr>
+          <a:xfrm>
+            <a:off x="5556937" y="5430368"/>
+            <a:ext cx="2151551" cy="400110"/>
+          </a:xfrm>
+          <a:prstGeom prst="rect">
+            <a:avLst/>
+          </a:prstGeom>
+          <a:noFill/>
+        </p:spPr>
+        <p:txBody>
+          <a:bodyPr wrap="none" rtlCol="0">
+            <a:spAutoFit/>
+          </a:bodyPr>
+          <a:lstStyle/>
+          <a:p>
+            <a:r>
+              <a:rPr lang="en-US" sz="2000"/>
+              <a:t>Raise new trigger</a:t>
+            </a:r>
+          </a:p>
+        </p:txBody>
+      </p:sp>
+      <p:cxnSp>
+        <p:nvCxnSpPr>
+          <p:cNvPr id="8" name="Straight Arrow Connector 7"/>
+          <p:cNvCxnSpPr>
+            <a:stCxn id="7" idx="1"/>
+          </p:cNvCxnSpPr>
+          <p:nvPr/>
+        </p:nvCxnSpPr>
+        <p:spPr>
+          <a:xfrm flipH="1" flipV="1">
+            <a:off x="2572719" y="5207432"/>
+            <a:ext cx="2984218" cy="422991"/>
+          </a:xfrm>
+          <a:prstGeom prst="straightConnector1">
+            <a:avLst/>
+          </a:prstGeom>
+          <a:ln>
+            <a:tailEnd type="arrow"/>
+          </a:ln>
+        </p:spPr>
+        <p:style>
+          <a:lnRef idx="2">
+            <a:schemeClr val="accent1"/>
+          </a:lnRef>
+          <a:fillRef idx="0">
+            <a:schemeClr val="accent1"/>
+          </a:fillRef>
+          <a:effectRef idx="1">
+            <a:schemeClr val="accent1"/>
+          </a:effectRef>
+          <a:fontRef idx="minor">
+            <a:schemeClr val="tx1"/>
+          </a:fontRef>
+        </p:style>
+      </p:cxnSp>
+      <p:sp>
+        <p:nvSpPr>
+          <p:cNvPr id="10" name="TextBox 9"/>
+          <p:cNvSpPr txBox="1"/>
+          <p:nvPr/>
+        </p:nvSpPr>
+        <p:spPr>
+          <a:xfrm>
+            <a:off x="5798237" y="3334894"/>
+            <a:ext cx="2765501" cy="400110"/>
+          </a:xfrm>
+          <a:prstGeom prst="rect">
+            <a:avLst/>
+          </a:prstGeom>
+          <a:noFill/>
+        </p:spPr>
+        <p:txBody>
+          <a:bodyPr wrap="none" rtlCol="0">
+            <a:spAutoFit/>
+          </a:bodyPr>
+          <a:lstStyle/>
+          <a:p>
+            <a:r>
+              <a:rPr lang="en-US" sz="2000"/>
+              <a:t>No transitions enabled</a:t>
+            </a:r>
+          </a:p>
+        </p:txBody>
+      </p:sp>
+      <p:sp>
+        <p:nvSpPr>
+          <p:cNvPr id="11" name="Right Brace 10"/>
+          <p:cNvSpPr/>
+          <p:nvPr/>
+        </p:nvSpPr>
+        <p:spPr bwMode="auto">
+          <a:xfrm>
+            <a:off x="5145437" y="2371241"/>
+            <a:ext cx="493363" cy="2324745"/>
+          </a:xfrm>
+          <a:prstGeom prst="rightBrace">
+            <a:avLst/>
+          </a:prstGeom>
+          <a:noFill/>
+          <a:ln w="38100" cap="flat" cmpd="sng" algn="ctr">
+            <a:solidFill>
+              <a:schemeClr val="tx1"/>
+            </a:solidFill>
+            <a:prstDash val="solid"/>
+            <a:round/>
+            <a:headEnd type="none" w="med" len="med"/>
+            <a:tailEnd type="none" w="med" len="med"/>
+          </a:ln>
+          <a:effectLst/>
+        </p:spPr>
+        <p:txBody>
+          <a:bodyPr vert="horz" wrap="square" lIns="91440" tIns="45720" rIns="91440" bIns="0" numCol="1" rtlCol="0" anchor="t" anchorCtr="0" compatLnSpc="1">
+            <a:prstTxWarp prst="textNoShape">
+              <a:avLst/>
+            </a:prstTxWarp>
+            <a:spAutoFit/>
+          </a:bodyPr>
+          <a:lstStyle/>
+          <a:p>
+            <a:pPr marL="0" marR="0" indent="0" algn="ctr" defTabSz="914400" rtl="0" eaLnBrk="0" fontAlgn="base" latinLnBrk="0" hangingPunct="0">
+              <a:lnSpc>
+                <a:spcPct val="100000"/>
+              </a:lnSpc>
+              <a:spcBef>
+                <a:spcPct val="0"/>
+              </a:spcBef>
+              <a:spcAft>
+                <a:spcPct val="0"/>
+              </a:spcAft>
+              <a:buClrTx/>
+              <a:buSzTx/>
+              <a:buFontTx/>
+              <a:buNone/>
+              <a:tabLst/>
+            </a:pPr>
+            <a:endParaRPr kumimoji="0" lang="en-US" sz="1200" b="0" i="0" u="none" strike="noStrike" cap="none" normalizeH="0" baseline="0">
+              <a:ln>
+                <a:noFill/>
+              </a:ln>
+              <a:solidFill>
+                <a:schemeClr val="tx1"/>
+              </a:solidFill>
+              <a:effectLst/>
+              <a:latin typeface="Lucida Sans" charset="0"/>
+              <a:ea typeface="ＭＳ Ｐゴシック" charset="-128"/>
+              <a:cs typeface="ＭＳ Ｐゴシック" charset="-128"/>
+            </a:endParaRPr>
+          </a:p>
+        </p:txBody>
+      </p:sp>
+    </p:spTree>
+    <p:extLst>
+      <p:ext uri="{BB962C8B-B14F-4D97-AF65-F5344CB8AC3E}">
+        <p14:creationId xmlns:p14="http://schemas.microsoft.com/office/powerpoint/2010/main" val="3695732330"/>
+      </p:ext>
+    </p:extLst>
+  </p:cSld>
+  <p:clrMapOvr>
+    <a:masterClrMapping/>
+  </p:clrMapOvr>
+  <p:timing>
+    <p:tnLst>
+      <p:par>
+        <p:cTn id="1" dur="indefinite" restart="never" nodeType="tmRoot"/>
+      </p:par>
+    </p:tnLst>
+  </p:timing>
+</p:sld>
+</file>
+
+<file path=ppt/slides/slide19.xml><?xml version="1.0" encoding="utf-8"?>
+<p:sld xmlns:a="http://schemas.openxmlformats.org/drawingml/2006/main" xmlns:r="http://schemas.openxmlformats.org/officeDocument/2006/relationships" xmlns:p="http://schemas.openxmlformats.org/presentationml/2006/main">
+  <p:cSld>
+    <p:spTree>
+      <p:nvGrpSpPr>
+        <p:cNvPr id="1" name=""/>
+        <p:cNvGrpSpPr/>
+        <p:nvPr/>
+      </p:nvGrpSpPr>
+      <p:grpSpPr>
+        <a:xfrm>
+          <a:off x="0" y="0"/>
+          <a:ext cx="0" cy="0"/>
+          <a:chOff x="0" y="0"/>
+          <a:chExt cx="0" cy="0"/>
+        </a:xfrm>
+      </p:grpSpPr>
+      <p:sp>
+        <p:nvSpPr>
+          <p:cNvPr id="2" name="Title 1"/>
+          <p:cNvSpPr>
+            <a:spLocks noGrp="1"/>
+          </p:cNvSpPr>
+          <p:nvPr>
+            <p:ph type="title"/>
+          </p:nvPr>
+        </p:nvSpPr>
+        <p:spPr/>
+        <p:txBody>
+          <a:bodyPr/>
+          <a:lstStyle/>
+          <a:p>
+            <a:r>
+              <a:rPr lang="en-US"/>
               <a:t>Triggered transition</a:t>
             </a:r>
           </a:p>
@@ -5919,8 +6404,8 @@
         </p:blipFill>
         <p:spPr bwMode="auto">
           <a:xfrm>
-            <a:off x="311150" y="2235201"/>
-            <a:ext cx="5940447" cy="3222476"/>
+            <a:off x="311150" y="898902"/>
+            <a:ext cx="5717691" cy="4558775"/>
           </a:xfrm>
           <a:prstGeom prst="rect">
             <a:avLst/>
@@ -5939,8 +6424,8 @@
         </p:nvSpPr>
         <p:spPr>
           <a:xfrm>
-            <a:off x="6606887" y="3080868"/>
-            <a:ext cx="1803311" cy="369332"/>
+            <a:off x="6467405" y="3080868"/>
+            <a:ext cx="2159566" cy="400110"/>
           </a:xfrm>
           <a:prstGeom prst="rect">
             <a:avLst/>
@@ -5954,7 +6439,7 @@
           <a:lstStyle/>
           <a:p>
             <a:r>
-              <a:rPr lang="en-US"/>
+              <a:rPr lang="en-US" sz="2000"/>
               <a:t>The trigger guard</a:t>
             </a:r>
           </a:p>
@@ -5968,8 +6453,8 @@
         </p:nvSpPr>
         <p:spPr>
           <a:xfrm>
-            <a:off x="6606887" y="4193275"/>
-            <a:ext cx="2422208" cy="369332"/>
+            <a:off x="6265926" y="4193276"/>
+            <a:ext cx="2932213" cy="400110"/>
           </a:xfrm>
           <a:prstGeom prst="rect">
             <a:avLst/>
@@ -5983,7 +6468,7 @@
           <a:lstStyle/>
           <a:p>
             <a:r>
-              <a:rPr lang="en-US"/>
+              <a:rPr lang="en-US" sz="2000" dirty="0"/>
               <a:t>Raise an internal trigger</a:t>
             </a:r>
           </a:p>
@@ -5998,7 +6483,7 @@
         <p:spPr>
           <a:xfrm>
             <a:off x="5688413" y="4700953"/>
-            <a:ext cx="2962432" cy="369332"/>
+            <a:ext cx="3480440" cy="400110"/>
           </a:xfrm>
           <a:prstGeom prst="rect">
             <a:avLst/>
@@ -6012,7 +6497,7 @@
           <a:lstStyle/>
           <a:p>
             <a:r>
-              <a:rPr lang="en-US"/>
+              <a:rPr lang="en-US" sz="2000"/>
               <a:t>Consume the external trigger</a:t>
             </a:r>
           </a:p>
@@ -6026,8 +6511,8 @@
         </p:nvCxnSpPr>
         <p:spPr>
           <a:xfrm flipH="1" flipV="1">
-            <a:off x="4775200" y="3080868"/>
-            <a:ext cx="1718298" cy="199785"/>
+            <a:off x="4664990" y="2045776"/>
+            <a:ext cx="1828508" cy="1234878"/>
           </a:xfrm>
           <a:prstGeom prst="straightConnector1">
             <a:avLst/>
@@ -6061,8 +6546,8 @@
         </p:nvCxnSpPr>
         <p:spPr>
           <a:xfrm flipH="1" flipV="1">
-            <a:off x="3810000" y="4581834"/>
-            <a:ext cx="1878413" cy="303785"/>
+            <a:off x="3810001" y="4193276"/>
+            <a:ext cx="1878412" cy="707732"/>
           </a:xfrm>
           <a:prstGeom prst="straightConnector1">
             <a:avLst/>
@@ -6089,15 +6574,13 @@
       <p:cxnSp>
         <p:nvCxnSpPr>
           <p:cNvPr id="13" name="Straight Arrow Connector 12"/>
-          <p:cNvCxnSpPr>
-            <a:stCxn id="7" idx="1"/>
-          </p:cNvCxnSpPr>
+          <p:cNvCxnSpPr/>
           <p:nvPr/>
         </p:nvCxnSpPr>
         <p:spPr>
-          <a:xfrm flipH="1">
-            <a:off x="3810000" y="4377941"/>
-            <a:ext cx="2796887" cy="0"/>
+          <a:xfrm flipH="1" flipV="1">
+            <a:off x="3810001" y="3890076"/>
+            <a:ext cx="2435816" cy="454263"/>
           </a:xfrm>
           <a:prstGeom prst="straightConnector1">
             <a:avLst/>
@@ -6141,136 +6624,6 @@
 </p:sld>
 </file>
 
-<file path=ppt/slides/slide19.xml><?xml version="1.0" encoding="utf-8"?>
-<p:sld xmlns:a="http://schemas.openxmlformats.org/drawingml/2006/main" xmlns:r="http://schemas.openxmlformats.org/officeDocument/2006/relationships" xmlns:p="http://schemas.openxmlformats.org/presentationml/2006/main">
-  <p:cSld>
-    <p:spTree>
-      <p:nvGrpSpPr>
-        <p:cNvPr id="1" name=""/>
-        <p:cNvGrpSpPr/>
-        <p:nvPr/>
-      </p:nvGrpSpPr>
-      <p:grpSpPr>
-        <a:xfrm>
-          <a:off x="0" y="0"/>
-          <a:ext cx="0" cy="0"/>
-          <a:chOff x="0" y="0"/>
-          <a:chExt cx="0" cy="0"/>
-        </a:xfrm>
-      </p:grpSpPr>
-      <p:sp>
-        <p:nvSpPr>
-          <p:cNvPr id="2" name="Title 1"/>
-          <p:cNvSpPr>
-            <a:spLocks noGrp="1"/>
-          </p:cNvSpPr>
-          <p:nvPr>
-            <p:ph type="title"/>
-          </p:nvPr>
-        </p:nvSpPr>
-        <p:spPr/>
-        <p:txBody>
-          <a:bodyPr/>
-          <a:lstStyle/>
-          <a:p>
-            <a:r>
-              <a:rPr lang="en-US"/>
-              <a:t>Conclusions</a:t>
-            </a:r>
-          </a:p>
-        </p:txBody>
-      </p:sp>
-      <p:sp>
-        <p:nvSpPr>
-          <p:cNvPr id="3" name="Content Placeholder 2"/>
-          <p:cNvSpPr>
-            <a:spLocks noGrp="1"/>
-          </p:cNvSpPr>
-          <p:nvPr>
-            <p:ph idx="1"/>
-          </p:nvPr>
-        </p:nvSpPr>
-        <p:spPr/>
-        <p:txBody>
-          <a:bodyPr>
-            <a:normAutofit fontScale="92500" lnSpcReduction="10000"/>
-          </a:bodyPr>
-          <a:lstStyle/>
-          <a:p>
-            <a:r>
-              <a:rPr lang="en-US"/>
-              <a:t>Strong motivation from engineers</a:t>
-            </a:r>
-          </a:p>
-          <a:p>
-            <a:endParaRPr lang="en-US"/>
-          </a:p>
-          <a:p>
-            <a:r>
-              <a:rPr lang="en-US"/>
-              <a:t>Difficult to reconcile semantic differences</a:t>
-            </a:r>
-          </a:p>
-          <a:p>
-            <a:pPr lvl="1"/>
-            <a:r>
-              <a:rPr lang="en-US"/>
-              <a:t>Run-to-completion, Sequential execution</a:t>
-            </a:r>
-          </a:p>
-          <a:p>
-            <a:pPr lvl="1"/>
-            <a:endParaRPr lang="en-US"/>
-          </a:p>
-          <a:p>
-            <a:r>
-              <a:rPr lang="en-US"/>
-              <a:t>We adopt a compromise</a:t>
-            </a:r>
-          </a:p>
-          <a:p>
-            <a:pPr lvl="1"/>
-            <a:r>
-              <a:rPr lang="en-US"/>
-              <a:t>Support what we can</a:t>
-            </a:r>
-          </a:p>
-          <a:p>
-            <a:pPr lvl="2"/>
-            <a:r>
-              <a:rPr lang="en-US"/>
-              <a:t>Add extensions where necessary</a:t>
-            </a:r>
-          </a:p>
-          <a:p>
-            <a:pPr lvl="1"/>
-            <a:r>
-              <a:rPr lang="en-US"/>
-              <a:t>Otherwise, restrict SCXML</a:t>
-            </a:r>
-          </a:p>
-        </p:txBody>
-      </p:sp>
-    </p:spTree>
-    <p:extLst>
-      <p:ext uri="{BB962C8B-B14F-4D97-AF65-F5344CB8AC3E}">
-        <p14:creationId xmlns:p14="http://schemas.microsoft.com/office/powerpoint/2010/main" val="1186958882"/>
-      </p:ext>
-    </p:extLst>
-  </p:cSld>
-  <p:clrMapOvr>
-    <a:masterClrMapping/>
-  </p:clrMapOvr>
-  <p:timing>
-    <p:tnLst>
-      <p:par>
-        <p:cTn id="1" dur="indefinite" restart="never" nodeType="tmRoot"/>
-      </p:par>
-    </p:tnLst>
-  </p:timing>
-</p:sld>
-</file>
-
 <file path=ppt/slides/slide2.xml><?xml version="1.0" encoding="utf-8"?>
 <p:sld xmlns:a="http://schemas.openxmlformats.org/drawingml/2006/main" xmlns:r="http://schemas.openxmlformats.org/officeDocument/2006/relationships" xmlns:p="http://schemas.openxmlformats.org/presentationml/2006/main">
   <p:cSld>
@@ -6304,9 +6657,10 @@
           <a:lstStyle/>
           <a:p>
             <a:r>
-              <a:rPr lang="en-US"/>
-              <a:t>Motivation</a:t>
-            </a:r>
+              <a:rPr lang="en-US" dirty="0" smtClean="0"/>
+              <a:t>Outline</a:t>
+            </a:r>
+            <a:endParaRPr lang="en-US" dirty="0"/>
           </a:p>
         </p:txBody>
       </p:sp>
@@ -6319,87 +6673,77 @@
           <p:nvPr>
             <p:ph idx="1"/>
           </p:nvPr>
-        </p:nvSpPr>
-        <p:spPr/>
-        <p:txBody>
-          <a:bodyPr>
-            <a:normAutofit fontScale="92500" lnSpcReduction="20000"/>
-          </a:bodyPr>
-          <a:lstStyle/>
-          <a:p>
-            <a:r>
-              <a:rPr lang="en-US"/>
-              <a:t>Event-B provides verification by formal proof</a:t>
-            </a:r>
-            <a:r>
-              <a:rPr lang="is-IS"/>
-              <a:t>…</a:t>
-            </a:r>
-            <a:endParaRPr lang="en-US"/>
-          </a:p>
-          <a:p>
-            <a:r>
-              <a:rPr lang="is-IS"/>
-              <a:t>… </a:t>
-            </a:r>
-            <a:r>
-              <a:rPr lang="en-US"/>
-              <a:t>but notation is restricted to simplify verification.</a:t>
-            </a:r>
-          </a:p>
-          <a:p>
-            <a:r>
-              <a:rPr lang="en-US"/>
-              <a:t>Engineers are used to a richer notation..</a:t>
-            </a:r>
-          </a:p>
-          <a:p>
-            <a:r>
-              <a:rPr lang="en-US"/>
-              <a:t>.. they may find the restrictions difficult to accept. </a:t>
-            </a:r>
-          </a:p>
-          <a:p>
-            <a:r>
-              <a:rPr lang="en-US"/>
-              <a:t> iUML-B State-machines help but still close to Event-B.</a:t>
-            </a:r>
-          </a:p>
-          <a:p>
-            <a:r>
-              <a:rPr lang="en-US"/>
-              <a:t>Can Harel style state-chart semantics be reconciled with iUML-B?</a:t>
-            </a:r>
-          </a:p>
-          <a:p>
-            <a:r>
-              <a:rPr lang="en-US"/>
-              <a:t> We investigate a translation from SCXML state-charts to iUML-B state-machines (and hence to Event-B).</a:t>
-            </a:r>
-          </a:p>
-        </p:txBody>
-      </p:sp>
-      <p:sp>
-        <p:nvSpPr>
-          <p:cNvPr id="6" name="TextBox 5"/>
-          <p:cNvSpPr txBox="1"/>
-          <p:nvPr/>
         </p:nvSpPr>
         <p:spPr>
           <a:xfrm>
-            <a:off x="4394200" y="6464300"/>
-            <a:ext cx="184731" cy="369332"/>
+            <a:off x="311150" y="1142274"/>
+            <a:ext cx="8496300" cy="4114800"/>
           </a:xfrm>
-          <a:prstGeom prst="rect">
-            <a:avLst/>
-          </a:prstGeom>
-          <a:noFill/>
         </p:spPr>
         <p:txBody>
-          <a:bodyPr wrap="none" rtlCol="0">
-            <a:spAutoFit/>
-          </a:bodyPr>
+          <a:bodyPr/>
           <a:lstStyle/>
+          <a:p>
+            <a:r>
+              <a:rPr lang="en-US" dirty="0" smtClean="0"/>
+              <a:t>Motivation</a:t>
+            </a:r>
+          </a:p>
+          <a:p>
+            <a:r>
+              <a:rPr lang="en-US" dirty="0" smtClean="0"/>
+              <a:t>Model Representations</a:t>
+            </a:r>
+          </a:p>
+          <a:p>
+            <a:pPr lvl="1"/>
+            <a:r>
+              <a:rPr lang="en-US" dirty="0" smtClean="0"/>
+              <a:t>SCXML</a:t>
+            </a:r>
+          </a:p>
+          <a:p>
+            <a:pPr lvl="1"/>
+            <a:r>
+              <a:rPr lang="en-US" dirty="0" err="1" smtClean="0"/>
+              <a:t>iUML</a:t>
+            </a:r>
+            <a:r>
+              <a:rPr lang="en-US" dirty="0" smtClean="0"/>
+              <a:t>-B</a:t>
+            </a:r>
+          </a:p>
+          <a:p>
+            <a:pPr lvl="1"/>
+            <a:r>
+              <a:rPr lang="en-US" dirty="0" smtClean="0"/>
+              <a:t>Similarities &amp; Differences in the Semantics</a:t>
+            </a:r>
+          </a:p>
+          <a:p>
+            <a:r>
+              <a:rPr lang="en-US" dirty="0" smtClean="0"/>
+              <a:t>Extensions to SCXML</a:t>
+            </a:r>
+          </a:p>
+          <a:p>
+            <a:r>
+              <a:rPr lang="en-US" dirty="0" smtClean="0"/>
+              <a:t>Prototype System Model</a:t>
+            </a:r>
+          </a:p>
+          <a:p>
+            <a:r>
+              <a:rPr lang="en-US" dirty="0" smtClean="0"/>
+              <a:t>Future Work</a:t>
+            </a:r>
+          </a:p>
+          <a:p>
+            <a:r>
+              <a:rPr lang="en-US" dirty="0" smtClean="0"/>
+              <a:t>Conclusions</a:t>
+            </a:r>
+          </a:p>
           <a:p>
             <a:endParaRPr lang="en-US" dirty="0"/>
           </a:p>
@@ -6408,7 +6752,7 @@
     </p:spTree>
     <p:extLst>
       <p:ext uri="{BB962C8B-B14F-4D97-AF65-F5344CB8AC3E}">
-        <p14:creationId xmlns:p14="http://schemas.microsoft.com/office/powerpoint/2010/main" val="3128286361"/>
+        <p14:creationId xmlns:p14="http://schemas.microsoft.com/office/powerpoint/2010/main" val="1957890682"/>
       </p:ext>
     </p:extLst>
   </p:cSld>
@@ -6449,6 +6793,141 @@
             <a:spLocks noGrp="1"/>
           </p:cNvSpPr>
           <p:nvPr>
+            <p:ph type="title"/>
+          </p:nvPr>
+        </p:nvSpPr>
+        <p:spPr/>
+        <p:txBody>
+          <a:bodyPr/>
+          <a:lstStyle/>
+          <a:p>
+            <a:r>
+              <a:rPr lang="en-US"/>
+              <a:t>Conclusions</a:t>
+            </a:r>
+          </a:p>
+        </p:txBody>
+      </p:sp>
+      <p:sp>
+        <p:nvSpPr>
+          <p:cNvPr id="3" name="Content Placeholder 2"/>
+          <p:cNvSpPr>
+            <a:spLocks noGrp="1"/>
+          </p:cNvSpPr>
+          <p:nvPr>
+            <p:ph idx="1"/>
+          </p:nvPr>
+        </p:nvSpPr>
+        <p:spPr>
+          <a:xfrm>
+            <a:off x="311150" y="1157772"/>
+            <a:ext cx="8496300" cy="4114800"/>
+          </a:xfrm>
+        </p:spPr>
+        <p:txBody>
+          <a:bodyPr>
+            <a:noAutofit/>
+          </a:bodyPr>
+          <a:lstStyle/>
+          <a:p>
+            <a:r>
+              <a:rPr lang="en-US" sz="2800" dirty="0"/>
+              <a:t>Strong motivation from engineers</a:t>
+            </a:r>
+          </a:p>
+          <a:p>
+            <a:endParaRPr lang="en-US" sz="2800" dirty="0"/>
+          </a:p>
+          <a:p>
+            <a:r>
+              <a:rPr lang="en-US" sz="2800" dirty="0"/>
+              <a:t>Difficult to reconcile semantic differences</a:t>
+            </a:r>
+          </a:p>
+          <a:p>
+            <a:pPr lvl="1"/>
+            <a:r>
+              <a:rPr lang="en-US" sz="2400" dirty="0"/>
+              <a:t>Run-to-completion, Sequential execution</a:t>
+            </a:r>
+          </a:p>
+          <a:p>
+            <a:pPr lvl="1"/>
+            <a:endParaRPr lang="en-US" sz="2400" dirty="0"/>
+          </a:p>
+          <a:p>
+            <a:r>
+              <a:rPr lang="en-US" sz="2800" dirty="0"/>
+              <a:t>We adopt a compromise</a:t>
+            </a:r>
+          </a:p>
+          <a:p>
+            <a:pPr lvl="1"/>
+            <a:r>
+              <a:rPr lang="en-US" sz="2400" dirty="0"/>
+              <a:t>Support what we can</a:t>
+            </a:r>
+          </a:p>
+          <a:p>
+            <a:pPr lvl="2"/>
+            <a:r>
+              <a:rPr lang="en-US" sz="2000" dirty="0"/>
+              <a:t>Add extensions where necessary</a:t>
+            </a:r>
+          </a:p>
+          <a:p>
+            <a:pPr lvl="1"/>
+            <a:r>
+              <a:rPr lang="en-US" sz="2400" dirty="0"/>
+              <a:t>Otherwise, restrict SCXML</a:t>
+            </a:r>
+          </a:p>
+        </p:txBody>
+      </p:sp>
+    </p:spTree>
+    <p:extLst>
+      <p:ext uri="{BB962C8B-B14F-4D97-AF65-F5344CB8AC3E}">
+        <p14:creationId xmlns:p14="http://schemas.microsoft.com/office/powerpoint/2010/main" val="1186958882"/>
+      </p:ext>
+    </p:extLst>
+  </p:cSld>
+  <p:clrMapOvr>
+    <a:masterClrMapping/>
+  </p:clrMapOvr>
+  <p:timing>
+    <p:tnLst>
+      <p:par>
+        <p:cTn id="1" dur="indefinite" restart="never" nodeType="tmRoot"/>
+      </p:par>
+    </p:tnLst>
+  </p:timing>
+</p:sld>
+</file>
+
+<file path=ppt/slides/slide21.xml><?xml version="1.0" encoding="utf-8"?>
+<p:sld xmlns:a="http://schemas.openxmlformats.org/drawingml/2006/main" xmlns:r="http://schemas.openxmlformats.org/officeDocument/2006/relationships" xmlns:p="http://schemas.openxmlformats.org/presentationml/2006/main">
+  <p:cSld>
+    <p:spTree>
+      <p:nvGrpSpPr>
+        <p:cNvPr id="1" name=""/>
+        <p:cNvGrpSpPr/>
+        <p:nvPr/>
+      </p:nvGrpSpPr>
+      <p:grpSpPr>
+        <a:xfrm>
+          <a:off x="0" y="0"/>
+          <a:ext cx="0" cy="0"/>
+          <a:chOff x="0" y="0"/>
+          <a:chExt cx="0" cy="0"/>
+        </a:xfrm>
+      </p:grpSpPr>
+      <p:sp>
+        <p:nvSpPr>
+          <p:cNvPr id="2" name="Title 1"/>
+          <p:cNvSpPr>
+            <a:spLocks noGrp="1"/>
+          </p:cNvSpPr>
+          <p:nvPr>
             <p:ph type="ctrTitle"/>
           </p:nvPr>
         </p:nvSpPr>
@@ -6545,7 +7024,7 @@
           <a:p>
             <a:r>
               <a:rPr lang="en-US"/>
-              <a:t>SCXML</a:t>
+              <a:t>Motivation</a:t>
             </a:r>
           </a:p>
         </p:txBody>
@@ -6562,51 +7041,129 @@
         </p:nvSpPr>
         <p:spPr/>
         <p:txBody>
-          <a:bodyPr/>
+          <a:bodyPr>
+            <a:normAutofit fontScale="92500" lnSpcReduction="20000"/>
+          </a:bodyPr>
           <a:lstStyle/>
           <a:p>
             <a:r>
-              <a:rPr lang="en-US"/>
-              <a:t>State Chart XML : </a:t>
-            </a:r>
-          </a:p>
-          <a:p>
-            <a:pPr lvl="1"/>
-            <a:r>
-              <a:rPr lang="en-US"/>
-              <a:t>State Machine Notation for Control Abstraction</a:t>
-            </a:r>
-          </a:p>
-          <a:p>
-            <a:r>
-              <a:rPr lang="en-US"/>
-              <a:t>XML notation</a:t>
-            </a:r>
-          </a:p>
-          <a:p>
-            <a:r>
-              <a:rPr lang="en-US"/>
-              <a:t>Harel Statecharts</a:t>
-            </a:r>
-          </a:p>
-          <a:p>
-            <a:r>
-              <a:rPr lang="en-US"/>
-              <a:t>Executable (via simulator tools)</a:t>
-            </a:r>
-          </a:p>
-          <a:p>
-            <a:r>
-              <a:rPr lang="en-US"/>
-              <a:t>Related to CCXML Call Control XML, event-based telephony</a:t>
-            </a:r>
+              <a:rPr lang="en-US" dirty="0"/>
+              <a:t>Event-B provides verification by formal proof</a:t>
+            </a:r>
+            <a:r>
+              <a:rPr lang="is-IS" dirty="0"/>
+              <a:t>…</a:t>
+            </a:r>
+            <a:endParaRPr lang="en-US" dirty="0"/>
+          </a:p>
+          <a:p>
+            <a:r>
+              <a:rPr lang="is-IS" dirty="0"/>
+              <a:t>… </a:t>
+            </a:r>
+            <a:r>
+              <a:rPr lang="en-US" dirty="0"/>
+              <a:t>but notation is restricted to simplify verification.</a:t>
+            </a:r>
+          </a:p>
+          <a:p>
+            <a:r>
+              <a:rPr lang="en-US" dirty="0"/>
+              <a:t>Engineers are used to a richer notation..</a:t>
+            </a:r>
+          </a:p>
+          <a:p>
+            <a:r>
+              <a:rPr lang="en-US" dirty="0"/>
+              <a:t>.. they may find the restrictions difficult to accept. </a:t>
+            </a:r>
+          </a:p>
+          <a:p>
+            <a:r>
+              <a:rPr lang="en-US" dirty="0"/>
+              <a:t> </a:t>
+            </a:r>
+            <a:r>
+              <a:rPr lang="en-US" dirty="0" err="1"/>
+              <a:t>iUML</a:t>
+            </a:r>
+            <a:r>
+              <a:rPr lang="en-US" dirty="0"/>
+              <a:t>-B State-machines help but still close to Event-B.</a:t>
+            </a:r>
+          </a:p>
+          <a:p>
+            <a:r>
+              <a:rPr lang="en-US" dirty="0"/>
+              <a:t>Can </a:t>
+            </a:r>
+            <a:r>
+              <a:rPr lang="en-US" dirty="0" err="1"/>
+              <a:t>Harel</a:t>
+            </a:r>
+            <a:r>
+              <a:rPr lang="en-US" dirty="0"/>
+              <a:t> style state-chart semantics be reconciled with </a:t>
+            </a:r>
+            <a:r>
+              <a:rPr lang="en-US" dirty="0" err="1"/>
+              <a:t>iUML</a:t>
+            </a:r>
+            <a:r>
+              <a:rPr lang="en-US" dirty="0"/>
+              <a:t>-B?</a:t>
+            </a:r>
+          </a:p>
+          <a:p>
+            <a:r>
+              <a:rPr lang="en-US" dirty="0" smtClean="0"/>
+              <a:t>We </a:t>
+            </a:r>
+            <a:r>
+              <a:rPr lang="en-US" dirty="0"/>
+              <a:t>investigate a translation from SCXML state-charts to </a:t>
+            </a:r>
+            <a:r>
+              <a:rPr lang="en-US" dirty="0" err="1"/>
+              <a:t>iUML</a:t>
+            </a:r>
+            <a:r>
+              <a:rPr lang="en-US" dirty="0"/>
+              <a:t>-B state-machines (and hence to Event-B).</a:t>
+            </a:r>
+          </a:p>
+        </p:txBody>
+      </p:sp>
+      <p:sp>
+        <p:nvSpPr>
+          <p:cNvPr id="6" name="TextBox 5"/>
+          <p:cNvSpPr txBox="1"/>
+          <p:nvPr/>
+        </p:nvSpPr>
+        <p:spPr>
+          <a:xfrm>
+            <a:off x="4394200" y="6464300"/>
+            <a:ext cx="184731" cy="369332"/>
+          </a:xfrm>
+          <a:prstGeom prst="rect">
+            <a:avLst/>
+          </a:prstGeom>
+          <a:noFill/>
+        </p:spPr>
+        <p:txBody>
+          <a:bodyPr wrap="none" rtlCol="0">
+            <a:spAutoFit/>
+          </a:bodyPr>
+          <a:lstStyle/>
+          <a:p>
+            <a:endParaRPr lang="en-US" dirty="0"/>
           </a:p>
         </p:txBody>
       </p:sp>
     </p:spTree>
     <p:extLst>
       <p:ext uri="{BB962C8B-B14F-4D97-AF65-F5344CB8AC3E}">
-        <p14:creationId xmlns:p14="http://schemas.microsoft.com/office/powerpoint/2010/main" val="1977118680"/>
+        <p14:creationId xmlns:p14="http://schemas.microsoft.com/office/powerpoint/2010/main" val="3128286361"/>
       </p:ext>
     </p:extLst>
   </p:cSld>
@@ -6650,313 +7207,90 @@
             <p:ph type="title"/>
           </p:nvPr>
         </p:nvSpPr>
-        <p:spPr/>
+        <p:spPr>
+          <a:xfrm>
+            <a:off x="0" y="0"/>
+            <a:ext cx="9144000" cy="649288"/>
+          </a:xfrm>
+        </p:spPr>
         <p:txBody>
           <a:bodyPr/>
           <a:lstStyle/>
           <a:p>
             <a:r>
-              <a:rPr lang="en-US"/>
-              <a:t>SCXML</a:t>
-            </a:r>
-          </a:p>
-        </p:txBody>
-      </p:sp>
-      <p:sp>
-        <p:nvSpPr>
-          <p:cNvPr id="4" name="Rectangle 3"/>
-          <p:cNvSpPr/>
-          <p:nvPr/>
-        </p:nvSpPr>
-        <p:spPr>
-          <a:xfrm>
-            <a:off x="544530" y="1835654"/>
-            <a:ext cx="3749675" cy="3231653"/>
-          </a:xfrm>
-          <a:prstGeom prst="rect">
-            <a:avLst/>
-          </a:prstGeom>
-        </p:spPr>
-        <p:txBody>
-          <a:bodyPr wrap="square">
-            <a:spAutoFit/>
-          </a:bodyPr>
+              <a:rPr lang="en-US" sz="3200" dirty="0" smtClean="0"/>
+              <a:t>SCXML: State Chart </a:t>
+            </a:r>
+            <a:r>
+              <a:rPr lang="en-US" sz="3200" dirty="0" err="1" smtClean="0"/>
+              <a:t>eXtensible</a:t>
+            </a:r>
+            <a:r>
+              <a:rPr lang="en-US" sz="3200" dirty="0" smtClean="0"/>
+              <a:t> Markup Language</a:t>
+            </a:r>
+            <a:endParaRPr lang="en-US" sz="3200" dirty="0"/>
+          </a:p>
+        </p:txBody>
+      </p:sp>
+      <p:sp>
+        <p:nvSpPr>
+          <p:cNvPr id="3" name="Content Placeholder 2"/>
+          <p:cNvSpPr>
+            <a:spLocks noGrp="1"/>
+          </p:cNvSpPr>
+          <p:nvPr>
+            <p:ph idx="1"/>
+          </p:nvPr>
+        </p:nvSpPr>
+        <p:spPr/>
+        <p:txBody>
+          <a:bodyPr/>
           <a:lstStyle/>
           <a:p>
             <a:r>
-              <a:rPr lang="en-US" sz="1200"/>
-              <a:t>&lt;?xml version="1.0"?&gt;</a:t>
-            </a:r>
-          </a:p>
-          <a:p>
-            <a:r>
-              <a:rPr lang="en-US" sz="1200"/>
-              <a:t>&lt;scxml xmlns="http://www.w3.org/2005/07/scxml"</a:t>
-            </a:r>
-          </a:p>
-          <a:p>
-            <a:r>
-              <a:rPr lang="en-US" sz="1200"/>
-              <a:t>       version="1.0"</a:t>
-            </a:r>
-          </a:p>
-          <a:p>
-            <a:r>
-              <a:rPr lang="en-US" sz="1200"/>
-              <a:t>       datamodel="ecmascript"</a:t>
-            </a:r>
-          </a:p>
-          <a:p>
-            <a:r>
-              <a:rPr lang="en-US" sz="1200"/>
-              <a:t>       initial="off"&gt;</a:t>
-            </a:r>
-          </a:p>
-          <a:p>
-            <a:endParaRPr lang="en-US" sz="1200"/>
-          </a:p>
-          <a:p>
-            <a:r>
-              <a:rPr lang="en-US" sz="1200"/>
-              <a:t>  &lt;!--  trivial 5 second microwave oven example --&gt;</a:t>
-            </a:r>
-          </a:p>
-          <a:p>
-            <a:r>
-              <a:rPr lang="en-US" sz="1200"/>
-              <a:t>  &lt;datamodel&gt;</a:t>
-            </a:r>
-          </a:p>
-          <a:p>
-            <a:r>
-              <a:rPr lang="en-US" sz="1200"/>
-              <a:t>    &lt;data id="cook_time" expr="5"/&gt;</a:t>
-            </a:r>
-          </a:p>
-          <a:p>
-            <a:r>
-              <a:rPr lang="en-US" sz="1200"/>
-              <a:t>    &lt;data id="door_closed" expr="true"/&gt;</a:t>
-            </a:r>
-          </a:p>
-          <a:p>
-            <a:r>
-              <a:rPr lang="en-US" sz="1200"/>
-              <a:t>    &lt;data id="timer" expr="0"/&gt;</a:t>
-            </a:r>
-          </a:p>
-          <a:p>
-            <a:r>
-              <a:rPr lang="en-US" sz="1200"/>
-              <a:t>  &lt;/datamodel&gt;</a:t>
-            </a:r>
-          </a:p>
-          <a:p>
-            <a:endParaRPr lang="en-US" sz="1200"/>
-          </a:p>
-          <a:p>
-            <a:r>
-              <a:rPr lang="en-US" sz="1200"/>
-              <a:t>  &lt;state id="off"&gt;</a:t>
-            </a:r>
-          </a:p>
-          <a:p>
-            <a:r>
-              <a:rPr lang="en-US" sz="1200"/>
-              <a:t>    &lt;!-- off state --&gt;</a:t>
-            </a:r>
-          </a:p>
-          <a:p>
-            <a:r>
-              <a:rPr lang="en-US" sz="1200"/>
-              <a:t>    &lt;transition event="turn.on" target="on"/&gt;</a:t>
-            </a:r>
-          </a:p>
-          <a:p>
-            <a:r>
-              <a:rPr lang="en-US" sz="1200"/>
-              <a:t>  &lt;/state&gt;</a:t>
-            </a:r>
-          </a:p>
-        </p:txBody>
-      </p:sp>
-      <p:sp>
-        <p:nvSpPr>
-          <p:cNvPr id="5" name="Rectangle 4"/>
-          <p:cNvSpPr/>
-          <p:nvPr/>
-        </p:nvSpPr>
-        <p:spPr>
-          <a:xfrm>
-            <a:off x="4696365" y="1305939"/>
-            <a:ext cx="4307935" cy="5078312"/>
-          </a:xfrm>
-          <a:prstGeom prst="rect">
-            <a:avLst/>
-          </a:prstGeom>
-        </p:spPr>
-        <p:txBody>
-          <a:bodyPr wrap="square">
-            <a:spAutoFit/>
-          </a:bodyPr>
-          <a:lstStyle/>
-          <a:p>
-            <a:endParaRPr lang="en-US" sz="1200"/>
-          </a:p>
-          <a:p>
-            <a:r>
-              <a:rPr lang="en-US" sz="1200"/>
-              <a:t>  &lt;state id="on"&gt;</a:t>
-            </a:r>
-          </a:p>
-          <a:p>
-            <a:r>
-              <a:rPr lang="en-US" sz="1200"/>
-              <a:t>    &lt;initial&gt;</a:t>
-            </a:r>
-          </a:p>
-          <a:p>
-            <a:r>
-              <a:rPr lang="en-US" sz="1200"/>
-              <a:t>        &lt;transition target="idle"/&gt;</a:t>
-            </a:r>
-          </a:p>
-          <a:p>
-            <a:r>
-              <a:rPr lang="en-US" sz="1200"/>
-              <a:t>    &lt;/initial&gt;</a:t>
-            </a:r>
-          </a:p>
-          <a:p>
-            <a:r>
-              <a:rPr lang="en-US" sz="1200"/>
-              <a:t>    &lt;!-- on/pause state --&gt;</a:t>
-            </a:r>
-          </a:p>
-          <a:p>
-            <a:r>
-              <a:rPr lang="en-US" sz="1200"/>
-              <a:t>    &lt;transition event="turn.off" target="off"/&gt;</a:t>
-            </a:r>
-          </a:p>
-          <a:p>
-            <a:r>
-              <a:rPr lang="en-US" sz="1200"/>
-              <a:t>    &lt;transition cond="timer &amp;gt;= cook_time" target="off"/&gt;</a:t>
-            </a:r>
-          </a:p>
-          <a:p>
-            <a:r>
-              <a:rPr lang="en-US" sz="1200"/>
-              <a:t>    &lt;state id="idle"&gt;</a:t>
-            </a:r>
-          </a:p>
-          <a:p>
-            <a:r>
-              <a:rPr lang="en-US" sz="1200"/>
-              <a:t>      &lt;!-- default immediate transition if door is shut --&gt;</a:t>
-            </a:r>
-          </a:p>
-          <a:p>
-            <a:r>
-              <a:rPr lang="en-US" sz="1200"/>
-              <a:t>      &lt;transition cond="door_closed" target="cooking"/&gt;</a:t>
-            </a:r>
-          </a:p>
-          <a:p>
-            <a:r>
-              <a:rPr lang="en-US" sz="1200"/>
-              <a:t>      &lt;transition event="door.close" target="cooking"&gt;</a:t>
-            </a:r>
-          </a:p>
-          <a:p>
-            <a:r>
-              <a:rPr lang="en-US" sz="1200"/>
-              <a:t>        &lt;assign location="door_closed" expr="true"/&gt;</a:t>
-            </a:r>
-          </a:p>
-          <a:p>
-            <a:r>
-              <a:rPr lang="en-US" sz="1200"/>
-              <a:t>        &lt;!-- start cooking --&gt;</a:t>
-            </a:r>
-          </a:p>
-          <a:p>
-            <a:r>
-              <a:rPr lang="en-US" sz="1200"/>
-              <a:t>      &lt;/transition&gt;</a:t>
-            </a:r>
-          </a:p>
-          <a:p>
-            <a:r>
-              <a:rPr lang="en-US" sz="1200"/>
-              <a:t>    &lt;/state&gt;</a:t>
-            </a:r>
-          </a:p>
-          <a:p>
-            <a:r>
-              <a:rPr lang="en-US" sz="1200"/>
-              <a:t>    &lt;state id="cooking"&gt;</a:t>
-            </a:r>
-          </a:p>
-          <a:p>
-            <a:r>
-              <a:rPr lang="en-US" sz="1200"/>
-              <a:t>      &lt;transition event="door.open" target="idle"&gt;</a:t>
-            </a:r>
-          </a:p>
-          <a:p>
-            <a:r>
-              <a:rPr lang="en-US" sz="1200"/>
-              <a:t>        &lt;assign location="door_closed" expr="false"/&gt;</a:t>
-            </a:r>
-          </a:p>
-          <a:p>
-            <a:r>
-              <a:rPr lang="en-US" sz="1200"/>
-              <a:t>      &lt;/transition&gt;</a:t>
-            </a:r>
-          </a:p>
-          <a:p>
-            <a:r>
-              <a:rPr lang="en-US" sz="1200"/>
-              <a:t>      &lt;!-- a 'time' event is seen once a second --&gt;</a:t>
-            </a:r>
-          </a:p>
-          <a:p>
-            <a:r>
-              <a:rPr lang="en-US" sz="1200"/>
-              <a:t>      &lt;transition event="time"&gt;</a:t>
-            </a:r>
-          </a:p>
-          <a:p>
-            <a:r>
-              <a:rPr lang="en-US" sz="1200"/>
-              <a:t>        &lt;assign location="timer" expr="timer + 1"/&gt;</a:t>
-            </a:r>
-          </a:p>
-          <a:p>
-            <a:r>
-              <a:rPr lang="en-US" sz="1200"/>
-              <a:t>      &lt;/transition&gt;</a:t>
-            </a:r>
-          </a:p>
-          <a:p>
-            <a:r>
-              <a:rPr lang="en-US" sz="1200"/>
-              <a:t>    &lt;/state&gt;</a:t>
-            </a:r>
-          </a:p>
-          <a:p>
-            <a:r>
-              <a:rPr lang="en-US" sz="1200"/>
-              <a:t>  &lt;/state&gt;</a:t>
-            </a:r>
-          </a:p>
-          <a:p>
-            <a:r>
-              <a:rPr lang="en-US" sz="1200"/>
-              <a:t>&lt;/scxml&gt;</a:t>
+              <a:rPr lang="en-US" dirty="0"/>
+              <a:t>State Chart XML : </a:t>
+            </a:r>
+          </a:p>
+          <a:p>
+            <a:pPr lvl="1"/>
+            <a:r>
+              <a:rPr lang="en-US" dirty="0"/>
+              <a:t>State Machine Notation for Control Abstraction</a:t>
+            </a:r>
+          </a:p>
+          <a:p>
+            <a:r>
+              <a:rPr lang="en-US" dirty="0"/>
+              <a:t>XML notation</a:t>
+            </a:r>
+          </a:p>
+          <a:p>
+            <a:r>
+              <a:rPr lang="en-US" dirty="0" err="1"/>
+              <a:t>Harel</a:t>
+            </a:r>
+            <a:r>
+              <a:rPr lang="en-US" dirty="0"/>
+              <a:t> </a:t>
+            </a:r>
+            <a:r>
+              <a:rPr lang="en-US" dirty="0" err="1"/>
+              <a:t>Statecharts</a:t>
+            </a:r>
+            <a:endParaRPr lang="en-US" dirty="0"/>
+          </a:p>
+          <a:p>
+            <a:r>
+              <a:rPr lang="en-US" dirty="0"/>
+              <a:t>Executable (via simulator tools)</a:t>
+            </a:r>
+          </a:p>
+          <a:p>
+            <a:r>
+              <a:rPr lang="en-US" dirty="0"/>
+              <a:t>Related to CCXML Call Control XML, event-based telephony</a:t>
             </a:r>
           </a:p>
         </p:txBody>
@@ -6964,7 +7298,7 @@
     </p:spTree>
     <p:extLst>
       <p:ext uri="{BB962C8B-B14F-4D97-AF65-F5344CB8AC3E}">
-        <p14:creationId xmlns:p14="http://schemas.microsoft.com/office/powerpoint/2010/main" val="656815330"/>
+        <p14:creationId xmlns:p14="http://schemas.microsoft.com/office/powerpoint/2010/main" val="1977118680"/>
       </p:ext>
     </p:extLst>
   </p:cSld>
@@ -7015,39 +7349,498 @@
           <a:p>
             <a:r>
               <a:rPr lang="en-US"/>
-              <a:t>iUML-B Statemachines</a:t>
-            </a:r>
-          </a:p>
-        </p:txBody>
-      </p:sp>
-      <p:pic>
-        <p:nvPicPr>
-          <p:cNvPr id="3" name="Picture 2"/>
-          <p:cNvPicPr>
-            <a:picLocks noChangeAspect="1"/>
-          </p:cNvPicPr>
+              <a:t>SCXML</a:t>
+            </a:r>
+          </a:p>
+        </p:txBody>
+      </p:sp>
+      <p:sp>
+        <p:nvSpPr>
+          <p:cNvPr id="4" name="Rectangle 3"/>
+          <p:cNvSpPr/>
           <p:nvPr/>
-        </p:nvPicPr>
-        <p:blipFill>
-          <a:blip r:embed="rId2"/>
-          <a:stretch>
-            <a:fillRect/>
-          </a:stretch>
-        </p:blipFill>
+        </p:nvSpPr>
         <p:spPr>
           <a:xfrm>
-            <a:off x="1360686" y="2265553"/>
-            <a:ext cx="6841228" cy="3485878"/>
+            <a:off x="212410" y="1310342"/>
+            <a:ext cx="4019803" cy="4185761"/>
           </a:xfrm>
           <a:prstGeom prst="rect">
             <a:avLst/>
           </a:prstGeom>
         </p:spPr>
-      </p:pic>
+        <p:txBody>
+          <a:bodyPr wrap="square">
+            <a:spAutoFit/>
+          </a:bodyPr>
+          <a:lstStyle/>
+          <a:p>
+            <a:r>
+              <a:rPr lang="en-US" sz="1400" dirty="0"/>
+              <a:t>&lt;?xml version="1.0"?&gt;</a:t>
+            </a:r>
+          </a:p>
+          <a:p>
+            <a:r>
+              <a:rPr lang="en-US" sz="1400" dirty="0"/>
+              <a:t>&lt;</a:t>
+            </a:r>
+            <a:r>
+              <a:rPr lang="en-US" sz="1400" dirty="0" err="1" smtClean="0"/>
+              <a:t>scxml</a:t>
+            </a:r>
+            <a:r>
+              <a:rPr lang="en-US" sz="1400" dirty="0"/>
+              <a:t> </a:t>
+            </a:r>
+            <a:r>
+              <a:rPr lang="en-US" sz="1400" dirty="0" smtClean="0"/>
+              <a:t>   </a:t>
+            </a:r>
+            <a:r>
+              <a:rPr lang="en-US" sz="1400" dirty="0" err="1" smtClean="0"/>
+              <a:t>xmlns</a:t>
+            </a:r>
+            <a:r>
+              <a:rPr lang="en-US" sz="1400" dirty="0"/>
+              <a:t>="http://www.w3.org/2005/07/</a:t>
+            </a:r>
+            <a:r>
+              <a:rPr lang="en-US" sz="1400" dirty="0" err="1"/>
+              <a:t>scxml</a:t>
+            </a:r>
+            <a:r>
+              <a:rPr lang="en-US" sz="1400" dirty="0"/>
+              <a:t>"</a:t>
+            </a:r>
+          </a:p>
+          <a:p>
+            <a:r>
+              <a:rPr lang="en-US" sz="1400" dirty="0"/>
+              <a:t>     </a:t>
+            </a:r>
+            <a:r>
+              <a:rPr lang="en-US" sz="1400" dirty="0" smtClean="0"/>
+              <a:t> </a:t>
+            </a:r>
+            <a:r>
+              <a:rPr lang="en-US" sz="1400" dirty="0"/>
+              <a:t>version="1.0"</a:t>
+            </a:r>
+          </a:p>
+          <a:p>
+            <a:r>
+              <a:rPr lang="en-US" sz="1400" dirty="0"/>
+              <a:t>       </a:t>
+            </a:r>
+            <a:r>
+              <a:rPr lang="en-US" sz="1400" dirty="0" err="1"/>
+              <a:t>datamodel</a:t>
+            </a:r>
+            <a:r>
+              <a:rPr lang="en-US" sz="1400" dirty="0"/>
+              <a:t>="</a:t>
+            </a:r>
+            <a:r>
+              <a:rPr lang="en-US" sz="1400" dirty="0" err="1"/>
+              <a:t>ecmascript</a:t>
+            </a:r>
+            <a:r>
+              <a:rPr lang="en-US" sz="1400" dirty="0"/>
+              <a:t>"</a:t>
+            </a:r>
+          </a:p>
+          <a:p>
+            <a:r>
+              <a:rPr lang="en-US" sz="1400" dirty="0"/>
+              <a:t>       initial="off"&gt;</a:t>
+            </a:r>
+          </a:p>
+          <a:p>
+            <a:endParaRPr lang="en-US" sz="1400" dirty="0"/>
+          </a:p>
+          <a:p>
+            <a:r>
+              <a:rPr lang="en-US" sz="1400" dirty="0"/>
+              <a:t>  &lt;!--  trivial 5 second microwave oven example --&gt;</a:t>
+            </a:r>
+          </a:p>
+          <a:p>
+            <a:r>
+              <a:rPr lang="en-US" sz="1400" dirty="0"/>
+              <a:t>  &lt;</a:t>
+            </a:r>
+            <a:r>
+              <a:rPr lang="en-US" sz="1400" dirty="0" err="1"/>
+              <a:t>datamodel</a:t>
+            </a:r>
+            <a:r>
+              <a:rPr lang="en-US" sz="1400" dirty="0"/>
+              <a:t>&gt;</a:t>
+            </a:r>
+          </a:p>
+          <a:p>
+            <a:r>
+              <a:rPr lang="en-US" sz="1400" dirty="0"/>
+              <a:t>    &lt;data id="</a:t>
+            </a:r>
+            <a:r>
+              <a:rPr lang="en-US" sz="1400" dirty="0" err="1"/>
+              <a:t>cook_time</a:t>
+            </a:r>
+            <a:r>
+              <a:rPr lang="en-US" sz="1400" dirty="0"/>
+              <a:t>" expr="5"/&gt;</a:t>
+            </a:r>
+          </a:p>
+          <a:p>
+            <a:r>
+              <a:rPr lang="en-US" sz="1400" dirty="0"/>
+              <a:t>    &lt;data id="</a:t>
+            </a:r>
+            <a:r>
+              <a:rPr lang="en-US" sz="1400" dirty="0" err="1"/>
+              <a:t>door_closed</a:t>
+            </a:r>
+            <a:r>
+              <a:rPr lang="en-US" sz="1400" dirty="0"/>
+              <a:t>" expr="true"/&gt;</a:t>
+            </a:r>
+          </a:p>
+          <a:p>
+            <a:r>
+              <a:rPr lang="en-US" sz="1400" dirty="0"/>
+              <a:t>    &lt;data id="timer" expr="0"/&gt;</a:t>
+            </a:r>
+          </a:p>
+          <a:p>
+            <a:r>
+              <a:rPr lang="en-US" sz="1400" dirty="0"/>
+              <a:t>  &lt;/</a:t>
+            </a:r>
+            <a:r>
+              <a:rPr lang="en-US" sz="1400" dirty="0" err="1"/>
+              <a:t>datamodel</a:t>
+            </a:r>
+            <a:r>
+              <a:rPr lang="en-US" sz="1400" dirty="0"/>
+              <a:t>&gt;</a:t>
+            </a:r>
+          </a:p>
+          <a:p>
+            <a:endParaRPr lang="en-US" sz="1400" dirty="0"/>
+          </a:p>
+          <a:p>
+            <a:r>
+              <a:rPr lang="en-US" sz="1400" dirty="0"/>
+              <a:t>  &lt;state id="off"&gt;</a:t>
+            </a:r>
+          </a:p>
+          <a:p>
+            <a:r>
+              <a:rPr lang="en-US" sz="1400" dirty="0"/>
+              <a:t>    &lt;!-- off state --&gt;</a:t>
+            </a:r>
+          </a:p>
+          <a:p>
+            <a:r>
+              <a:rPr lang="en-US" sz="1400" dirty="0"/>
+              <a:t>    &lt;transition event="</a:t>
+            </a:r>
+            <a:r>
+              <a:rPr lang="en-US" sz="1400" dirty="0" err="1"/>
+              <a:t>turn.on</a:t>
+            </a:r>
+            <a:r>
+              <a:rPr lang="en-US" sz="1400" dirty="0"/>
+              <a:t>" target="on"/&gt;</a:t>
+            </a:r>
+          </a:p>
+          <a:p>
+            <a:r>
+              <a:rPr lang="en-US" sz="1400" dirty="0"/>
+              <a:t>  &lt;/state&gt;</a:t>
+            </a:r>
+          </a:p>
+        </p:txBody>
+      </p:sp>
+      <p:sp>
+        <p:nvSpPr>
+          <p:cNvPr id="5" name="Rectangle 4"/>
+          <p:cNvSpPr/>
+          <p:nvPr/>
+        </p:nvSpPr>
+        <p:spPr>
+          <a:xfrm>
+            <a:off x="4308530" y="480447"/>
+            <a:ext cx="4959457" cy="6124754"/>
+          </a:xfrm>
+          <a:prstGeom prst="rect">
+            <a:avLst/>
+          </a:prstGeom>
+        </p:spPr>
+        <p:txBody>
+          <a:bodyPr wrap="square">
+            <a:spAutoFit/>
+          </a:bodyPr>
+          <a:lstStyle/>
+          <a:p>
+            <a:endParaRPr lang="en-US" sz="1400" dirty="0"/>
+          </a:p>
+          <a:p>
+            <a:r>
+              <a:rPr lang="en-US" sz="1400" dirty="0"/>
+              <a:t>  &lt;state id="on"&gt;</a:t>
+            </a:r>
+          </a:p>
+          <a:p>
+            <a:r>
+              <a:rPr lang="en-US" sz="1400" dirty="0"/>
+              <a:t>    &lt;initial&gt;</a:t>
+            </a:r>
+          </a:p>
+          <a:p>
+            <a:r>
+              <a:rPr lang="en-US" sz="1400" dirty="0"/>
+              <a:t>        &lt;transition target="idle"/&gt;</a:t>
+            </a:r>
+          </a:p>
+          <a:p>
+            <a:r>
+              <a:rPr lang="en-US" sz="1400" dirty="0"/>
+              <a:t>    &lt;/initial&gt;</a:t>
+            </a:r>
+          </a:p>
+          <a:p>
+            <a:r>
+              <a:rPr lang="en-US" sz="1400" dirty="0"/>
+              <a:t>    &lt;!-- on/pause state --&gt;</a:t>
+            </a:r>
+          </a:p>
+          <a:p>
+            <a:r>
+              <a:rPr lang="en-US" sz="1400" dirty="0"/>
+              <a:t>    &lt;transition event="</a:t>
+            </a:r>
+            <a:r>
+              <a:rPr lang="en-US" sz="1400" dirty="0" err="1"/>
+              <a:t>turn.off</a:t>
+            </a:r>
+            <a:r>
+              <a:rPr lang="en-US" sz="1400" dirty="0"/>
+              <a:t>" target="off"/&gt;</a:t>
+            </a:r>
+          </a:p>
+          <a:p>
+            <a:r>
+              <a:rPr lang="en-US" sz="1400" dirty="0"/>
+              <a:t>    &lt;transition </a:t>
+            </a:r>
+            <a:r>
+              <a:rPr lang="en-US" sz="1400" dirty="0" err="1"/>
+              <a:t>cond</a:t>
+            </a:r>
+            <a:r>
+              <a:rPr lang="en-US" sz="1400" dirty="0"/>
+              <a:t>="timer &amp;</a:t>
+            </a:r>
+            <a:r>
+              <a:rPr lang="en-US" sz="1400" dirty="0" err="1"/>
+              <a:t>gt</a:t>
+            </a:r>
+            <a:r>
+              <a:rPr lang="en-US" sz="1400" dirty="0"/>
+              <a:t>;= </a:t>
+            </a:r>
+            <a:r>
+              <a:rPr lang="en-US" sz="1400" dirty="0" err="1" smtClean="0"/>
+              <a:t>cook_time</a:t>
+            </a:r>
+            <a:r>
+              <a:rPr lang="en-US" sz="1400" dirty="0" smtClean="0"/>
+              <a:t>” target</a:t>
+            </a:r>
+            <a:r>
+              <a:rPr lang="en-US" sz="1400" dirty="0"/>
+              <a:t>="off"/&gt;</a:t>
+            </a:r>
+          </a:p>
+          <a:p>
+            <a:r>
+              <a:rPr lang="en-US" sz="1400" dirty="0"/>
+              <a:t>    &lt;state id="idle"&gt;</a:t>
+            </a:r>
+          </a:p>
+          <a:p>
+            <a:r>
+              <a:rPr lang="en-US" sz="1400" dirty="0"/>
+              <a:t>      &lt;!-- default immediate transition if door is shut --&gt;</a:t>
+            </a:r>
+          </a:p>
+          <a:p>
+            <a:r>
+              <a:rPr lang="en-US" sz="1400" dirty="0"/>
+              <a:t>      &lt;transition </a:t>
+            </a:r>
+            <a:r>
+              <a:rPr lang="en-US" sz="1400" dirty="0" err="1"/>
+              <a:t>cond</a:t>
+            </a:r>
+            <a:r>
+              <a:rPr lang="en-US" sz="1400" dirty="0"/>
+              <a:t>="</a:t>
+            </a:r>
+            <a:r>
+              <a:rPr lang="en-US" sz="1400" dirty="0" err="1"/>
+              <a:t>door_closed</a:t>
+            </a:r>
+            <a:r>
+              <a:rPr lang="en-US" sz="1400" dirty="0"/>
+              <a:t>" target="cooking"/&gt;</a:t>
+            </a:r>
+          </a:p>
+          <a:p>
+            <a:r>
+              <a:rPr lang="en-US" sz="1400" dirty="0"/>
+              <a:t>      &lt;transition event="</a:t>
+            </a:r>
+            <a:r>
+              <a:rPr lang="en-US" sz="1400" dirty="0" err="1"/>
+              <a:t>door.close</a:t>
+            </a:r>
+            <a:r>
+              <a:rPr lang="en-US" sz="1400" dirty="0"/>
+              <a:t>" target="cooking"&gt;</a:t>
+            </a:r>
+          </a:p>
+          <a:p>
+            <a:r>
+              <a:rPr lang="en-US" sz="1400" dirty="0"/>
+              <a:t>        &lt;assign location="</a:t>
+            </a:r>
+            <a:r>
+              <a:rPr lang="en-US" sz="1400" dirty="0" err="1"/>
+              <a:t>door_closed</a:t>
+            </a:r>
+            <a:r>
+              <a:rPr lang="en-US" sz="1400" dirty="0"/>
+              <a:t>" expr="true"/&gt;</a:t>
+            </a:r>
+          </a:p>
+          <a:p>
+            <a:r>
+              <a:rPr lang="en-US" sz="1400" dirty="0"/>
+              <a:t>        &lt;!-- start cooking --&gt;</a:t>
+            </a:r>
+          </a:p>
+          <a:p>
+            <a:r>
+              <a:rPr lang="en-US" sz="1400" dirty="0"/>
+              <a:t>      &lt;/transition&gt;</a:t>
+            </a:r>
+          </a:p>
+          <a:p>
+            <a:r>
+              <a:rPr lang="en-US" sz="1400" dirty="0"/>
+              <a:t>    &lt;/state&gt;</a:t>
+            </a:r>
+          </a:p>
+          <a:p>
+            <a:r>
+              <a:rPr lang="en-US" sz="1400" dirty="0"/>
+              <a:t>    &lt;state id="cooking"&gt;</a:t>
+            </a:r>
+          </a:p>
+          <a:p>
+            <a:r>
+              <a:rPr lang="en-US" sz="1400" dirty="0"/>
+              <a:t>      &lt;transition event="</a:t>
+            </a:r>
+            <a:r>
+              <a:rPr lang="en-US" sz="1400" dirty="0" err="1"/>
+              <a:t>door.open</a:t>
+            </a:r>
+            <a:r>
+              <a:rPr lang="en-US" sz="1400" dirty="0"/>
+              <a:t>" target="idle"&gt;</a:t>
+            </a:r>
+          </a:p>
+          <a:p>
+            <a:r>
+              <a:rPr lang="en-US" sz="1400" dirty="0"/>
+              <a:t>        &lt;assign location="</a:t>
+            </a:r>
+            <a:r>
+              <a:rPr lang="en-US" sz="1400" dirty="0" err="1"/>
+              <a:t>door_closed</a:t>
+            </a:r>
+            <a:r>
+              <a:rPr lang="en-US" sz="1400" dirty="0"/>
+              <a:t>" expr="false"/&gt;</a:t>
+            </a:r>
+          </a:p>
+          <a:p>
+            <a:r>
+              <a:rPr lang="en-US" sz="1400" dirty="0"/>
+              <a:t>      &lt;/transition&gt;</a:t>
+            </a:r>
+          </a:p>
+          <a:p>
+            <a:r>
+              <a:rPr lang="en-US" sz="1400" dirty="0"/>
+              <a:t>      &lt;!-- a 'time' event is seen once a second --&gt;</a:t>
+            </a:r>
+          </a:p>
+          <a:p>
+            <a:r>
+              <a:rPr lang="en-US" sz="1400" dirty="0"/>
+              <a:t>      &lt;transition event="time"&gt;</a:t>
+            </a:r>
+          </a:p>
+          <a:p>
+            <a:r>
+              <a:rPr lang="en-US" sz="1400" dirty="0"/>
+              <a:t>        &lt;assign location="timer" expr="timer + 1"/&gt;</a:t>
+            </a:r>
+          </a:p>
+          <a:p>
+            <a:r>
+              <a:rPr lang="en-US" sz="1400" dirty="0"/>
+              <a:t>      &lt;/transition&gt;</a:t>
+            </a:r>
+          </a:p>
+          <a:p>
+            <a:r>
+              <a:rPr lang="en-US" sz="1400" dirty="0"/>
+              <a:t>    &lt;/state&gt;</a:t>
+            </a:r>
+          </a:p>
+          <a:p>
+            <a:r>
+              <a:rPr lang="en-US" sz="1400" dirty="0"/>
+              <a:t>  &lt;/state&gt;</a:t>
+            </a:r>
+          </a:p>
+          <a:p>
+            <a:r>
+              <a:rPr lang="en-US" sz="1400" dirty="0"/>
+              <a:t>&lt;/</a:t>
+            </a:r>
+            <a:r>
+              <a:rPr lang="en-US" sz="1400" dirty="0" err="1"/>
+              <a:t>scxml</a:t>
+            </a:r>
+            <a:r>
+              <a:rPr lang="en-US" sz="1400" dirty="0"/>
+              <a:t>&gt;</a:t>
+            </a:r>
+          </a:p>
+        </p:txBody>
+      </p:sp>
     </p:spTree>
     <p:extLst>
       <p:ext uri="{BB962C8B-B14F-4D97-AF65-F5344CB8AC3E}">
-        <p14:creationId xmlns:p14="http://schemas.microsoft.com/office/powerpoint/2010/main" val="2653694905"/>
+        <p14:creationId xmlns:p14="http://schemas.microsoft.com/office/powerpoint/2010/main" val="656815330"/>
       </p:ext>
     </p:extLst>
   </p:cSld>
@@ -7105,7 +7898,7 @@
       </p:sp>
       <p:pic>
         <p:nvPicPr>
-          <p:cNvPr id="4" name="Picture 3"/>
+          <p:cNvPr id="3" name="Picture 2"/>
           <p:cNvPicPr>
             <a:picLocks noChangeAspect="1"/>
           </p:cNvPicPr>
@@ -7119,8 +7912,8 @@
         </p:blipFill>
         <p:spPr>
           <a:xfrm>
-            <a:off x="521586" y="1882188"/>
-            <a:ext cx="7579211" cy="4237994"/>
+            <a:off x="137722" y="1084882"/>
+            <a:ext cx="9006278" cy="4589057"/>
           </a:xfrm>
           <a:prstGeom prst="rect">
             <a:avLst/>
@@ -7130,7 +7923,7 @@
     </p:spTree>
     <p:extLst>
       <p:ext uri="{BB962C8B-B14F-4D97-AF65-F5344CB8AC3E}">
-        <p14:creationId xmlns:p14="http://schemas.microsoft.com/office/powerpoint/2010/main" val="4285186983"/>
+        <p14:creationId xmlns:p14="http://schemas.microsoft.com/office/powerpoint/2010/main" val="2653694905"/>
       </p:ext>
     </p:extLst>
   </p:cSld>
@@ -7181,70 +7974,39 @@
           <a:p>
             <a:r>
               <a:rPr lang="en-US"/>
-              <a:t>Similarities</a:t>
-            </a:r>
-          </a:p>
-        </p:txBody>
-      </p:sp>
-      <p:sp>
-        <p:nvSpPr>
-          <p:cNvPr id="3" name="Content Placeholder 2"/>
-          <p:cNvSpPr>
-            <a:spLocks noGrp="1"/>
-          </p:cNvSpPr>
-          <p:nvPr>
-            <p:ph idx="1"/>
-          </p:nvPr>
-        </p:nvSpPr>
-        <p:spPr/>
-        <p:txBody>
-          <a:bodyPr/>
-          <a:lstStyle/>
-          <a:p>
-            <a:r>
-              <a:rPr lang="en-US"/>
-              <a:t>Hierarchical nested state-charts</a:t>
-            </a:r>
-          </a:p>
-          <a:p>
-            <a:r>
-              <a:rPr lang="en-US"/>
-              <a:t>Transitions with </a:t>
-            </a:r>
-          </a:p>
-          <a:p>
-            <a:pPr lvl="1"/>
-            <a:r>
-              <a:rPr lang="en-US"/>
-              <a:t>Conditions / Guards</a:t>
-            </a:r>
-          </a:p>
-          <a:p>
-            <a:pPr lvl="1"/>
-            <a:r>
-              <a:rPr lang="en-US"/>
-              <a:t>Actions</a:t>
-            </a:r>
-          </a:p>
-          <a:p>
-            <a:r>
-              <a:rPr lang="en-US"/>
-              <a:t>States can have Entry and Exit Actions</a:t>
-            </a:r>
-          </a:p>
-          <a:p>
-            <a:pPr lvl="1"/>
-            <a:r>
-              <a:rPr lang="en-US"/>
-              <a:t>(use with care in iUML-B)</a:t>
-            </a:r>
-          </a:p>
-        </p:txBody>
-      </p:sp>
+              <a:t>iUML-B Statemachines</a:t>
+            </a:r>
+          </a:p>
+        </p:txBody>
+      </p:sp>
+      <p:pic>
+        <p:nvPicPr>
+          <p:cNvPr id="4" name="Picture 3"/>
+          <p:cNvPicPr>
+            <a:picLocks noChangeAspect="1"/>
+          </p:cNvPicPr>
+          <p:nvPr/>
+        </p:nvPicPr>
+        <p:blipFill>
+          <a:blip r:embed="rId2"/>
+          <a:stretch>
+            <a:fillRect/>
+          </a:stretch>
+        </p:blipFill>
+        <p:spPr>
+          <a:xfrm>
+            <a:off x="79509" y="1069383"/>
+            <a:ext cx="9005112" cy="5035301"/>
+          </a:xfrm>
+          <a:prstGeom prst="rect">
+            <a:avLst/>
+          </a:prstGeom>
+        </p:spPr>
+      </p:pic>
     </p:spTree>
     <p:extLst>
       <p:ext uri="{BB962C8B-B14F-4D97-AF65-F5344CB8AC3E}">
-        <p14:creationId xmlns:p14="http://schemas.microsoft.com/office/powerpoint/2010/main" val="1716355857"/>
+        <p14:creationId xmlns:p14="http://schemas.microsoft.com/office/powerpoint/2010/main" val="4285186983"/>
       </p:ext>
     </p:extLst>
   </p:cSld>
@@ -7295,7 +8057,7 @@
           <a:p>
             <a:r>
               <a:rPr lang="en-US"/>
-              <a:t>Differences</a:t>
+              <a:t>Similarities</a:t>
             </a:r>
           </a:p>
         </p:txBody>
@@ -7312,77 +8074,61 @@
         </p:nvSpPr>
         <p:spPr/>
         <p:txBody>
-          <a:bodyPr>
-            <a:normAutofit lnSpcReduction="10000"/>
-          </a:bodyPr>
+          <a:bodyPr/>
           <a:lstStyle/>
           <a:p>
             <a:r>
-              <a:rPr lang="en-US"/>
-              <a:t>Event-B has..</a:t>
+              <a:rPr lang="en-US" dirty="0"/>
+              <a:t>Hierarchical nested state-charts</a:t>
+            </a:r>
+          </a:p>
+          <a:p>
+            <a:r>
+              <a:rPr lang="en-US" dirty="0"/>
+              <a:t>Transitions with </a:t>
             </a:r>
           </a:p>
           <a:p>
             <a:pPr lvl="1"/>
             <a:r>
-              <a:rPr lang="en-US"/>
-              <a:t>Refinement </a:t>
+              <a:rPr lang="en-US" dirty="0"/>
+              <a:t>Conditions / Guards</a:t>
             </a:r>
           </a:p>
           <a:p>
             <a:pPr lvl="1"/>
             <a:r>
-              <a:rPr lang="en-US"/>
-              <a:t>Invariants</a:t>
+              <a:rPr lang="en-US" dirty="0"/>
+              <a:t>Actions</a:t>
+            </a:r>
+          </a:p>
+          <a:p>
+            <a:r>
+              <a:rPr lang="en-US" dirty="0"/>
+              <a:t>States can have Entry and Exit Actions</a:t>
             </a:r>
           </a:p>
           <a:p>
             <a:pPr lvl="1"/>
-            <a:endParaRPr lang="en-US"/>
-          </a:p>
-          <a:p>
-            <a:r>
-              <a:rPr lang="en-US"/>
-              <a:t>SCXML has..</a:t>
-            </a:r>
-          </a:p>
-          <a:p>
-            <a:pPr lvl="1"/>
-            <a:r>
-              <a:rPr lang="en-US"/>
-              <a:t>External Trigger events</a:t>
-            </a:r>
-          </a:p>
-          <a:p>
-            <a:pPr lvl="2"/>
-            <a:r>
-              <a:rPr lang="en-US"/>
-              <a:t>Hence transitions do not have a name/label</a:t>
-            </a:r>
-          </a:p>
-          <a:p>
-            <a:pPr lvl="1"/>
-            <a:r>
-              <a:rPr lang="en-US"/>
-              <a:t>Sequential actions</a:t>
-            </a:r>
-          </a:p>
-          <a:p>
-            <a:pPr lvl="1"/>
-            <a:r>
-              <a:rPr lang="en-US"/>
-              <a:t>Run to Completion – Big step/little step</a:t>
-            </a:r>
-          </a:p>
-          <a:p>
-            <a:endParaRPr lang="en-US"/>
+            <a:r>
+              <a:rPr lang="en-US" dirty="0"/>
+              <a:t>(use with care in </a:t>
+            </a:r>
+            <a:r>
+              <a:rPr lang="en-US" dirty="0" err="1"/>
+              <a:t>iUML</a:t>
+            </a:r>
+            <a:r>
+              <a:rPr lang="en-US" dirty="0"/>
+              <a:t>-B)</a:t>
+            </a:r>
           </a:p>
         </p:txBody>
       </p:sp>
     </p:spTree>
     <p:extLst>
       <p:ext uri="{BB962C8B-B14F-4D97-AF65-F5344CB8AC3E}">
-        <p14:creationId xmlns:p14="http://schemas.microsoft.com/office/powerpoint/2010/main" val="1296087290"/>
+        <p14:creationId xmlns:p14="http://schemas.microsoft.com/office/powerpoint/2010/main" val="1716355857"/>
       </p:ext>
     </p:extLst>
   </p:cSld>
@@ -7433,7 +8179,7 @@
           <a:p>
             <a:r>
               <a:rPr lang="en-US"/>
-              <a:t>SCXML Extensions</a:t>
+              <a:t>Differences</a:t>
             </a:r>
           </a:p>
         </p:txBody>
@@ -7448,141 +8194,84 @@
             <p:ph idx="1"/>
           </p:nvPr>
         </p:nvSpPr>
-        <p:spPr/>
+        <p:spPr>
+          <a:xfrm>
+            <a:off x="311150" y="1142274"/>
+            <a:ext cx="8496300" cy="4114800"/>
+          </a:xfrm>
+        </p:spPr>
         <p:txBody>
           <a:bodyPr>
-            <a:normAutofit/>
+            <a:noAutofit/>
           </a:bodyPr>
           <a:lstStyle/>
           <a:p>
             <a:r>
-              <a:rPr lang="en-US"/>
-              <a:t>XML tools allow new meta-model ‘namespaces’ to be introduced.</a:t>
+              <a:rPr lang="en-US" sz="2800" dirty="0"/>
+              <a:t>Event-B has..</a:t>
             </a:r>
           </a:p>
           <a:p>
             <a:pPr lvl="1"/>
             <a:r>
-              <a:rPr lang="en-US"/>
-              <a:t>Existing SCXML tools will ignore them</a:t>
+              <a:rPr lang="en-US" sz="2400" dirty="0"/>
+              <a:t>Refinement </a:t>
             </a:r>
           </a:p>
           <a:p>
             <a:pPr lvl="1"/>
-            <a:endParaRPr lang="en-US"/>
-          </a:p>
-          <a:p>
-            <a:r>
-              <a:rPr lang="en-US"/>
-              <a:t>Needed in order to support:</a:t>
+            <a:r>
+              <a:rPr lang="en-US" sz="2400" dirty="0"/>
+              <a:t>Invariants</a:t>
             </a:r>
           </a:p>
           <a:p>
             <a:pPr lvl="1"/>
-            <a:r>
-              <a:rPr lang="en-US"/>
-              <a:t>Refinement levels </a:t>
-            </a:r>
-            <a:r>
-              <a:rPr lang="en-US" sz="2000"/>
-              <a:t>(new attribute </a:t>
-            </a:r>
-            <a:r>
-              <a:rPr lang="en-US" sz="2000">
-                <a:solidFill>
-                  <a:srgbClr val="FF0000"/>
-                </a:solidFill>
-              </a:rPr>
-              <a:t>&lt;iumlb:refinement </a:t>
-            </a:r>
-            <a:r>
-              <a:rPr lang="is-IS" sz="2000">
-                <a:solidFill>
-                  <a:srgbClr val="FF0000"/>
-                </a:solidFill>
-              </a:rPr>
-              <a:t>…&gt;</a:t>
-            </a:r>
-            <a:r>
-              <a:rPr lang="is-IS" sz="2000"/>
-              <a:t>)</a:t>
-            </a:r>
-            <a:endParaRPr lang="en-US" sz="2000"/>
+            <a:endParaRPr lang="en-US" sz="2400" dirty="0"/>
+          </a:p>
+          <a:p>
+            <a:r>
+              <a:rPr lang="en-US" sz="2800" dirty="0"/>
+              <a:t>SCXML has..</a:t>
+            </a:r>
           </a:p>
           <a:p>
             <a:pPr lvl="1"/>
             <a:r>
-              <a:rPr lang="en-US"/>
-              <a:t>Invariants		</a:t>
-            </a:r>
-            <a:r>
-              <a:rPr lang="en-US" sz="2000"/>
-              <a:t>(new element </a:t>
-            </a:r>
-            <a:r>
-              <a:rPr lang="en-US" sz="2000">
-                <a:solidFill>
-                  <a:srgbClr val="FF0000"/>
-                </a:solidFill>
-              </a:rPr>
-              <a:t>&lt;iumlb:invariant </a:t>
-            </a:r>
-            <a:r>
-              <a:rPr lang="is-IS" sz="2000">
-                <a:solidFill>
-                  <a:srgbClr val="FF0000"/>
-                </a:solidFill>
-              </a:rPr>
-              <a:t>…&gt;</a:t>
-            </a:r>
-            <a:r>
-              <a:rPr lang="is-IS" sz="2000"/>
-              <a:t>)</a:t>
-            </a:r>
-            <a:endParaRPr lang="en-US" sz="2000"/>
+              <a:rPr lang="en-US" sz="2400" dirty="0"/>
+              <a:t>External Trigger events</a:t>
+            </a:r>
+          </a:p>
+          <a:p>
+            <a:pPr lvl="2"/>
+            <a:r>
+              <a:rPr lang="en-US" sz="2000" dirty="0"/>
+              <a:t>Hence transitions do not have a name/label</a:t>
+            </a:r>
           </a:p>
           <a:p>
             <a:pPr lvl="1"/>
             <a:r>
-              <a:rPr lang="en-US"/>
-              <a:t>Guards			</a:t>
-            </a:r>
-            <a:r>
-              <a:rPr lang="en-US" sz="2000"/>
-              <a:t>(new element </a:t>
-            </a:r>
-            <a:r>
-              <a:rPr lang="en-US" sz="2000">
-                <a:solidFill>
-                  <a:srgbClr val="FF0000"/>
-                </a:solidFill>
-              </a:rPr>
-              <a:t>&lt;iumlb:guard </a:t>
-            </a:r>
-            <a:r>
-              <a:rPr lang="is-IS" sz="2000">
-                <a:solidFill>
-                  <a:srgbClr val="FF0000"/>
-                </a:solidFill>
-              </a:rPr>
-              <a:t>…&gt;</a:t>
-            </a:r>
-            <a:r>
-              <a:rPr lang="is-IS" sz="2000"/>
-              <a:t>)</a:t>
-            </a:r>
-            <a:endParaRPr lang="en-US" sz="2000"/>
+              <a:rPr lang="en-US" sz="2400" dirty="0"/>
+              <a:t>Sequential actions</a:t>
+            </a:r>
           </a:p>
           <a:p>
             <a:pPr lvl="1"/>
-            <a:endParaRPr lang="en-US"/>
+            <a:r>
+              <a:rPr lang="en-US" sz="2400" dirty="0"/>
+              <a:t>Run to Completion – Big step/little step</a:t>
+            </a:r>
+          </a:p>
+          <a:p>
+            <a:endParaRPr lang="en-US" sz="2800" dirty="0"/>
           </a:p>
         </p:txBody>
       </p:sp>
     </p:spTree>
     <p:extLst>
       <p:ext uri="{BB962C8B-B14F-4D97-AF65-F5344CB8AC3E}">
-        <p14:creationId xmlns:p14="http://schemas.microsoft.com/office/powerpoint/2010/main" val="1426597746"/>
+        <p14:creationId xmlns:p14="http://schemas.microsoft.com/office/powerpoint/2010/main" val="1296087290"/>
       </p:ext>
     </p:extLst>
   </p:cSld>

</xml_diff>